<commit_message>
last fix i hope
</commit_message>
<xml_diff>
--- a/диплом.pptx
+++ b/диплом.pptx
@@ -4,18 +4,21 @@
   <p:sldMasterIdLst>
     <p:sldMasterId id="2147483660" r:id="rId1"/>
   </p:sldMasterIdLst>
+  <p:notesMasterIdLst>
+    <p:notesMasterId r:id="rId16"/>
+  </p:notesMasterIdLst>
   <p:sldIdLst>
     <p:sldId id="269" r:id="rId2"/>
     <p:sldId id="256" r:id="rId3"/>
     <p:sldId id="257" r:id="rId4"/>
     <p:sldId id="258" r:id="rId5"/>
-    <p:sldId id="259" r:id="rId6"/>
-    <p:sldId id="260" r:id="rId7"/>
-    <p:sldId id="261" r:id="rId8"/>
-    <p:sldId id="262" r:id="rId9"/>
-    <p:sldId id="263" r:id="rId10"/>
-    <p:sldId id="264" r:id="rId11"/>
-    <p:sldId id="265" r:id="rId12"/>
+    <p:sldId id="262" r:id="rId6"/>
+    <p:sldId id="259" r:id="rId7"/>
+    <p:sldId id="260" r:id="rId8"/>
+    <p:sldId id="261" r:id="rId9"/>
+    <p:sldId id="264" r:id="rId10"/>
+    <p:sldId id="265" r:id="rId11"/>
+    <p:sldId id="263" r:id="rId12"/>
     <p:sldId id="266" r:id="rId13"/>
     <p:sldId id="267" r:id="rId14"/>
     <p:sldId id="268" r:id="rId15"/>
@@ -126,13 +129,13 @@
             <p14:sldId id="256"/>
             <p14:sldId id="257"/>
             <p14:sldId id="258"/>
+            <p14:sldId id="262"/>
             <p14:sldId id="259"/>
             <p14:sldId id="260"/>
             <p14:sldId id="261"/>
-            <p14:sldId id="262"/>
-            <p14:sldId id="263"/>
             <p14:sldId id="264"/>
             <p14:sldId id="265"/>
+            <p14:sldId id="263"/>
             <p14:sldId id="266"/>
             <p14:sldId id="267"/>
             <p14:sldId id="268"/>
@@ -147,10 +150,365 @@
             <a:srgbClr val="A4A3A4"/>
           </p15:clr>
         </p15:guide>
+        <p15:guide id="2" pos="3840">
+          <p15:clr>
+            <a:srgbClr val="A4A3A4"/>
+          </p15:clr>
+        </p15:guide>
       </p15:sldGuideLst>
     </p:ext>
   </p:extLst>
 </p:presentation>
+</file>
+
+<file path=ppt/notesMasters/notesMaster1.xml><?xml version="1.0" encoding="utf-8"?>
+<p:notesMaster xmlns:a="http://schemas.openxmlformats.org/drawingml/2006/main" xmlns:r="http://schemas.openxmlformats.org/officeDocument/2006/relationships" xmlns:p="http://schemas.openxmlformats.org/presentationml/2006/main">
+  <p:cSld>
+    <p:bg>
+      <p:bgRef idx="1001">
+        <a:schemeClr val="bg1"/>
+      </p:bgRef>
+    </p:bg>
+    <p:spTree>
+      <p:nvGrpSpPr>
+        <p:cNvPr id="1" name=""/>
+        <p:cNvGrpSpPr/>
+        <p:nvPr/>
+      </p:nvGrpSpPr>
+      <p:grpSpPr>
+        <a:xfrm>
+          <a:off x="0" y="0"/>
+          <a:ext cx="0" cy="0"/>
+          <a:chOff x="0" y="0"/>
+          <a:chExt cx="0" cy="0"/>
+        </a:xfrm>
+      </p:grpSpPr>
+      <p:sp>
+        <p:nvSpPr>
+          <p:cNvPr id="2" name="Верхний колонтитул 1"/>
+          <p:cNvSpPr>
+            <a:spLocks noGrp="1"/>
+          </p:cNvSpPr>
+          <p:nvPr>
+            <p:ph type="hdr" sz="quarter"/>
+          </p:nvPr>
+        </p:nvSpPr>
+        <p:spPr>
+          <a:xfrm>
+            <a:off x="0" y="0"/>
+            <a:ext cx="2971800" cy="458788"/>
+          </a:xfrm>
+          <a:prstGeom prst="rect">
+            <a:avLst/>
+          </a:prstGeom>
+        </p:spPr>
+        <p:txBody>
+          <a:bodyPr vert="horz" lIns="91440" tIns="45720" rIns="91440" bIns="45720" rtlCol="0"/>
+          <a:lstStyle>
+            <a:lvl1pPr algn="l">
+              <a:defRPr sz="1200"/>
+            </a:lvl1pPr>
+          </a:lstStyle>
+          <a:p>
+            <a:endParaRPr lang="ru-RU"/>
+          </a:p>
+        </p:txBody>
+      </p:sp>
+      <p:sp>
+        <p:nvSpPr>
+          <p:cNvPr id="3" name="Дата 2"/>
+          <p:cNvSpPr>
+            <a:spLocks noGrp="1"/>
+          </p:cNvSpPr>
+          <p:nvPr>
+            <p:ph type="dt" idx="1"/>
+          </p:nvPr>
+        </p:nvSpPr>
+        <p:spPr>
+          <a:xfrm>
+            <a:off x="3884613" y="0"/>
+            <a:ext cx="2971800" cy="458788"/>
+          </a:xfrm>
+          <a:prstGeom prst="rect">
+            <a:avLst/>
+          </a:prstGeom>
+        </p:spPr>
+        <p:txBody>
+          <a:bodyPr vert="horz" lIns="91440" tIns="45720" rIns="91440" bIns="45720" rtlCol="0"/>
+          <a:lstStyle>
+            <a:lvl1pPr algn="r">
+              <a:defRPr sz="1200"/>
+            </a:lvl1pPr>
+          </a:lstStyle>
+          <a:p>
+            <a:fld id="{98164DDF-B1A3-4EC3-9CF7-DB5DC2156E89}" type="datetimeFigureOut">
+              <a:rPr lang="ru-RU" smtClean="0"/>
+              <a:t>23.06.2018</a:t>
+            </a:fld>
+            <a:endParaRPr lang="ru-RU"/>
+          </a:p>
+        </p:txBody>
+      </p:sp>
+      <p:sp>
+        <p:nvSpPr>
+          <p:cNvPr id="4" name="Образ слайда 3"/>
+          <p:cNvSpPr>
+            <a:spLocks noGrp="1" noRot="1" noChangeAspect="1"/>
+          </p:cNvSpPr>
+          <p:nvPr>
+            <p:ph type="sldImg" idx="2"/>
+          </p:nvPr>
+        </p:nvSpPr>
+        <p:spPr>
+          <a:xfrm>
+            <a:off x="685800" y="1143000"/>
+            <a:ext cx="5486400" cy="3086100"/>
+          </a:xfrm>
+          <a:prstGeom prst="rect">
+            <a:avLst/>
+          </a:prstGeom>
+          <a:noFill/>
+          <a:ln w="12700">
+            <a:solidFill>
+              <a:prstClr val="black"/>
+            </a:solidFill>
+          </a:ln>
+        </p:spPr>
+        <p:txBody>
+          <a:bodyPr vert="horz" lIns="91440" tIns="45720" rIns="91440" bIns="45720" rtlCol="0" anchor="ctr"/>
+          <a:lstStyle/>
+          <a:p>
+            <a:endParaRPr lang="ru-RU"/>
+          </a:p>
+        </p:txBody>
+      </p:sp>
+      <p:sp>
+        <p:nvSpPr>
+          <p:cNvPr id="5" name="Заметки 4"/>
+          <p:cNvSpPr>
+            <a:spLocks noGrp="1"/>
+          </p:cNvSpPr>
+          <p:nvPr>
+            <p:ph type="body" sz="quarter" idx="3"/>
+          </p:nvPr>
+        </p:nvSpPr>
+        <p:spPr>
+          <a:xfrm>
+            <a:off x="685800" y="4400550"/>
+            <a:ext cx="5486400" cy="3600450"/>
+          </a:xfrm>
+          <a:prstGeom prst="rect">
+            <a:avLst/>
+          </a:prstGeom>
+        </p:spPr>
+        <p:txBody>
+          <a:bodyPr vert="horz" lIns="91440" tIns="45720" rIns="91440" bIns="45720" rtlCol="0"/>
+          <a:lstStyle/>
+          <a:p>
+            <a:pPr lvl="0"/>
+            <a:r>
+              <a:rPr lang="ru-RU" smtClean="0"/>
+              <a:t>Образец текста</a:t>
+            </a:r>
+          </a:p>
+          <a:p>
+            <a:pPr lvl="1"/>
+            <a:r>
+              <a:rPr lang="ru-RU" smtClean="0"/>
+              <a:t>Второй уровень</a:t>
+            </a:r>
+          </a:p>
+          <a:p>
+            <a:pPr lvl="2"/>
+            <a:r>
+              <a:rPr lang="ru-RU" smtClean="0"/>
+              <a:t>Третий уровень</a:t>
+            </a:r>
+          </a:p>
+          <a:p>
+            <a:pPr lvl="3"/>
+            <a:r>
+              <a:rPr lang="ru-RU" smtClean="0"/>
+              <a:t>Четвертый уровень</a:t>
+            </a:r>
+          </a:p>
+          <a:p>
+            <a:pPr lvl="4"/>
+            <a:r>
+              <a:rPr lang="ru-RU" smtClean="0"/>
+              <a:t>Пятый уровень</a:t>
+            </a:r>
+            <a:endParaRPr lang="ru-RU"/>
+          </a:p>
+        </p:txBody>
+      </p:sp>
+      <p:sp>
+        <p:nvSpPr>
+          <p:cNvPr id="6" name="Нижний колонтитул 5"/>
+          <p:cNvSpPr>
+            <a:spLocks noGrp="1"/>
+          </p:cNvSpPr>
+          <p:nvPr>
+            <p:ph type="ftr" sz="quarter" idx="4"/>
+          </p:nvPr>
+        </p:nvSpPr>
+        <p:spPr>
+          <a:xfrm>
+            <a:off x="0" y="8685213"/>
+            <a:ext cx="2971800" cy="458787"/>
+          </a:xfrm>
+          <a:prstGeom prst="rect">
+            <a:avLst/>
+          </a:prstGeom>
+        </p:spPr>
+        <p:txBody>
+          <a:bodyPr vert="horz" lIns="91440" tIns="45720" rIns="91440" bIns="45720" rtlCol="0" anchor="b"/>
+          <a:lstStyle>
+            <a:lvl1pPr algn="l">
+              <a:defRPr sz="1200"/>
+            </a:lvl1pPr>
+          </a:lstStyle>
+          <a:p>
+            <a:endParaRPr lang="ru-RU"/>
+          </a:p>
+        </p:txBody>
+      </p:sp>
+      <p:sp>
+        <p:nvSpPr>
+          <p:cNvPr id="7" name="Номер слайда 6"/>
+          <p:cNvSpPr>
+            <a:spLocks noGrp="1"/>
+          </p:cNvSpPr>
+          <p:nvPr>
+            <p:ph type="sldNum" sz="quarter" idx="5"/>
+          </p:nvPr>
+        </p:nvSpPr>
+        <p:spPr>
+          <a:xfrm>
+            <a:off x="3884613" y="8685213"/>
+            <a:ext cx="2971800" cy="458787"/>
+          </a:xfrm>
+          <a:prstGeom prst="rect">
+            <a:avLst/>
+          </a:prstGeom>
+        </p:spPr>
+        <p:txBody>
+          <a:bodyPr vert="horz" lIns="91440" tIns="45720" rIns="91440" bIns="45720" rtlCol="0" anchor="b"/>
+          <a:lstStyle>
+            <a:lvl1pPr algn="r">
+              <a:defRPr sz="1200"/>
+            </a:lvl1pPr>
+          </a:lstStyle>
+          <a:p>
+            <a:fld id="{07D52D91-C6D0-4BA7-8C2E-1BD74179228D}" type="slidenum">
+              <a:rPr lang="ru-RU" smtClean="0"/>
+              <a:t>‹#›</a:t>
+            </a:fld>
+            <a:endParaRPr lang="ru-RU"/>
+          </a:p>
+        </p:txBody>
+      </p:sp>
+    </p:spTree>
+    <p:extLst>
+      <p:ext uri="{BB962C8B-B14F-4D97-AF65-F5344CB8AC3E}">
+        <p14:creationId xmlns:p14="http://schemas.microsoft.com/office/powerpoint/2010/main" val="3066750588"/>
+      </p:ext>
+    </p:extLst>
+  </p:cSld>
+  <p:clrMap bg1="lt1" tx1="dk1" bg2="lt2" tx2="dk2" accent1="accent1" accent2="accent2" accent3="accent3" accent4="accent4" accent5="accent5" accent6="accent6" hlink="hlink" folHlink="folHlink"/>
+  <p:notesStyle>
+    <a:lvl1pPr marL="0" algn="l" defTabSz="914400" rtl="0" eaLnBrk="1" latinLnBrk="0" hangingPunct="1">
+      <a:defRPr sz="1200" kern="1200">
+        <a:solidFill>
+          <a:schemeClr val="tx1"/>
+        </a:solidFill>
+        <a:latin typeface="+mn-lt"/>
+        <a:ea typeface="+mn-ea"/>
+        <a:cs typeface="+mn-cs"/>
+      </a:defRPr>
+    </a:lvl1pPr>
+    <a:lvl2pPr marL="457200" algn="l" defTabSz="914400" rtl="0" eaLnBrk="1" latinLnBrk="0" hangingPunct="1">
+      <a:defRPr sz="1200" kern="1200">
+        <a:solidFill>
+          <a:schemeClr val="tx1"/>
+        </a:solidFill>
+        <a:latin typeface="+mn-lt"/>
+        <a:ea typeface="+mn-ea"/>
+        <a:cs typeface="+mn-cs"/>
+      </a:defRPr>
+    </a:lvl2pPr>
+    <a:lvl3pPr marL="914400" algn="l" defTabSz="914400" rtl="0" eaLnBrk="1" latinLnBrk="0" hangingPunct="1">
+      <a:defRPr sz="1200" kern="1200">
+        <a:solidFill>
+          <a:schemeClr val="tx1"/>
+        </a:solidFill>
+        <a:latin typeface="+mn-lt"/>
+        <a:ea typeface="+mn-ea"/>
+        <a:cs typeface="+mn-cs"/>
+      </a:defRPr>
+    </a:lvl3pPr>
+    <a:lvl4pPr marL="1371600" algn="l" defTabSz="914400" rtl="0" eaLnBrk="1" latinLnBrk="0" hangingPunct="1">
+      <a:defRPr sz="1200" kern="1200">
+        <a:solidFill>
+          <a:schemeClr val="tx1"/>
+        </a:solidFill>
+        <a:latin typeface="+mn-lt"/>
+        <a:ea typeface="+mn-ea"/>
+        <a:cs typeface="+mn-cs"/>
+      </a:defRPr>
+    </a:lvl4pPr>
+    <a:lvl5pPr marL="1828800" algn="l" defTabSz="914400" rtl="0" eaLnBrk="1" latinLnBrk="0" hangingPunct="1">
+      <a:defRPr sz="1200" kern="1200">
+        <a:solidFill>
+          <a:schemeClr val="tx1"/>
+        </a:solidFill>
+        <a:latin typeface="+mn-lt"/>
+        <a:ea typeface="+mn-ea"/>
+        <a:cs typeface="+mn-cs"/>
+      </a:defRPr>
+    </a:lvl5pPr>
+    <a:lvl6pPr marL="2286000" algn="l" defTabSz="914400" rtl="0" eaLnBrk="1" latinLnBrk="0" hangingPunct="1">
+      <a:defRPr sz="1200" kern="1200">
+        <a:solidFill>
+          <a:schemeClr val="tx1"/>
+        </a:solidFill>
+        <a:latin typeface="+mn-lt"/>
+        <a:ea typeface="+mn-ea"/>
+        <a:cs typeface="+mn-cs"/>
+      </a:defRPr>
+    </a:lvl6pPr>
+    <a:lvl7pPr marL="2743200" algn="l" defTabSz="914400" rtl="0" eaLnBrk="1" latinLnBrk="0" hangingPunct="1">
+      <a:defRPr sz="1200" kern="1200">
+        <a:solidFill>
+          <a:schemeClr val="tx1"/>
+        </a:solidFill>
+        <a:latin typeface="+mn-lt"/>
+        <a:ea typeface="+mn-ea"/>
+        <a:cs typeface="+mn-cs"/>
+      </a:defRPr>
+    </a:lvl7pPr>
+    <a:lvl8pPr marL="3200400" algn="l" defTabSz="914400" rtl="0" eaLnBrk="1" latinLnBrk="0" hangingPunct="1">
+      <a:defRPr sz="1200" kern="1200">
+        <a:solidFill>
+          <a:schemeClr val="tx1"/>
+        </a:solidFill>
+        <a:latin typeface="+mn-lt"/>
+        <a:ea typeface="+mn-ea"/>
+        <a:cs typeface="+mn-cs"/>
+      </a:defRPr>
+    </a:lvl8pPr>
+    <a:lvl9pPr marL="3657600" algn="l" defTabSz="914400" rtl="0" eaLnBrk="1" latinLnBrk="0" hangingPunct="1">
+      <a:defRPr sz="1200" kern="1200">
+        <a:solidFill>
+          <a:schemeClr val="tx1"/>
+        </a:solidFill>
+        <a:latin typeface="+mn-lt"/>
+        <a:ea typeface="+mn-ea"/>
+        <a:cs typeface="+mn-cs"/>
+      </a:defRPr>
+    </a:lvl9pPr>
+  </p:notesStyle>
+</p:notesMaster>
 </file>
 
 <file path=ppt/slideLayouts/slideLayout1.xml><?xml version="1.0" encoding="utf-8"?>
@@ -486,9 +844,9 @@
             </a:lvl1pPr>
           </a:lstStyle>
           <a:p>
-            <a:fld id="{49836411-3652-416A-A19E-8993570B20D4}" type="datetimeFigureOut">
+            <a:fld id="{1F3BFE95-40AA-40EE-A178-43B122002C07}" type="datetime1">
               <a:rPr lang="ru-RU" smtClean="0"/>
-              <a:t>19.06.2018</a:t>
+              <a:t>23.06.2018</a:t>
             </a:fld>
             <a:endParaRPr lang="ru-RU"/>
           </a:p>
@@ -1574,9 +1932,9 @@
           <a:bodyPr/>
           <a:lstStyle/>
           <a:p>
-            <a:fld id="{49836411-3652-416A-A19E-8993570B20D4}" type="datetimeFigureOut">
+            <a:fld id="{1C9523FB-BC31-4CA2-B847-C19A42F37CBA}" type="datetime1">
               <a:rPr lang="ru-RU" smtClean="0"/>
-              <a:t>19.06.2018</a:t>
+              <a:t>23.06.2018</a:t>
             </a:fld>
             <a:endParaRPr lang="ru-RU"/>
           </a:p>
@@ -2554,9 +2912,9 @@
           <a:bodyPr/>
           <a:lstStyle/>
           <a:p>
-            <a:fld id="{49836411-3652-416A-A19E-8993570B20D4}" type="datetimeFigureOut">
+            <a:fld id="{F03BA7CE-1C1C-46F2-8400-EC3E13FE4227}" type="datetime1">
               <a:rPr lang="ru-RU" smtClean="0"/>
-              <a:t>19.06.2018</a:t>
+              <a:t>23.06.2018</a:t>
             </a:fld>
             <a:endParaRPr lang="ru-RU"/>
           </a:p>
@@ -3688,9 +4046,9 @@
           <a:bodyPr/>
           <a:lstStyle/>
           <a:p>
-            <a:fld id="{49836411-3652-416A-A19E-8993570B20D4}" type="datetimeFigureOut">
+            <a:fld id="{CE67C553-85A3-44D1-B05D-0EC76C5DFA7C}" type="datetime1">
               <a:rPr lang="ru-RU" smtClean="0"/>
-              <a:t>19.06.2018</a:t>
+              <a:t>23.06.2018</a:t>
             </a:fld>
             <a:endParaRPr lang="ru-RU"/>
           </a:p>
@@ -4721,9 +5079,9 @@
           <a:bodyPr/>
           <a:lstStyle/>
           <a:p>
-            <a:fld id="{49836411-3652-416A-A19E-8993570B20D4}" type="datetimeFigureOut">
+            <a:fld id="{BCA60730-C8CA-4BAD-BCA3-B55A11F4E67A}" type="datetime1">
               <a:rPr lang="ru-RU" smtClean="0"/>
-              <a:t>19.06.2018</a:t>
+              <a:t>23.06.2018</a:t>
             </a:fld>
             <a:endParaRPr lang="ru-RU"/>
           </a:p>
@@ -5381,9 +5739,9 @@
           <a:bodyPr/>
           <a:lstStyle/>
           <a:p>
-            <a:fld id="{49836411-3652-416A-A19E-8993570B20D4}" type="datetimeFigureOut">
+            <a:fld id="{3725E77C-B66C-4C1C-9067-B11B0E207348}" type="datetime1">
               <a:rPr lang="ru-RU" smtClean="0"/>
-              <a:t>19.06.2018</a:t>
+              <a:t>23.06.2018</a:t>
             </a:fld>
             <a:endParaRPr lang="ru-RU"/>
           </a:p>
@@ -6242,9 +6600,9 @@
           <a:bodyPr/>
           <a:lstStyle/>
           <a:p>
-            <a:fld id="{49836411-3652-416A-A19E-8993570B20D4}" type="datetimeFigureOut">
+            <a:fld id="{B162EBE7-D446-4878-A8FC-41F28120AA00}" type="datetime1">
               <a:rPr lang="ru-RU" smtClean="0"/>
-              <a:t>19.06.2018</a:t>
+              <a:t>23.06.2018</a:t>
             </a:fld>
             <a:endParaRPr lang="ru-RU"/>
           </a:p>
@@ -6432,9 +6790,9 @@
           <a:bodyPr/>
           <a:lstStyle/>
           <a:p>
-            <a:fld id="{49836411-3652-416A-A19E-8993570B20D4}" type="datetimeFigureOut">
+            <a:fld id="{EC25E487-2934-4D3D-BE4B-719AC8863156}" type="datetime1">
               <a:rPr lang="ru-RU" smtClean="0"/>
-              <a:t>19.06.2018</a:t>
+              <a:t>23.06.2018</a:t>
             </a:fld>
             <a:endParaRPr lang="ru-RU"/>
           </a:p>
@@ -7404,9 +7762,9 @@
           <a:bodyPr/>
           <a:lstStyle/>
           <a:p>
-            <a:fld id="{49836411-3652-416A-A19E-8993570B20D4}" type="datetimeFigureOut">
+            <a:fld id="{65C8B421-570E-42F0-930C-0C8BA55466F9}" type="datetime1">
               <a:rPr lang="ru-RU" smtClean="0"/>
-              <a:t>19.06.2018</a:t>
+              <a:t>23.06.2018</a:t>
             </a:fld>
             <a:endParaRPr lang="ru-RU"/>
           </a:p>
@@ -7615,9 +7973,9 @@
           <a:bodyPr/>
           <a:lstStyle/>
           <a:p>
-            <a:fld id="{49836411-3652-416A-A19E-8993570B20D4}" type="datetimeFigureOut">
+            <a:fld id="{2C039C95-375E-416C-B19B-807F26F998D3}" type="datetime1">
               <a:rPr lang="ru-RU" smtClean="0"/>
-              <a:t>19.06.2018</a:t>
+              <a:t>23.06.2018</a:t>
             </a:fld>
             <a:endParaRPr lang="ru-RU"/>
           </a:p>
@@ -8649,9 +9007,9 @@
           <a:bodyPr/>
           <a:lstStyle/>
           <a:p>
-            <a:fld id="{49836411-3652-416A-A19E-8993570B20D4}" type="datetimeFigureOut">
+            <a:fld id="{D3CA89CD-22F8-44D9-8C2A-8A4EC8585FF1}" type="datetime1">
               <a:rPr lang="ru-RU" smtClean="0"/>
-              <a:t>19.06.2018</a:t>
+              <a:t>23.06.2018</a:t>
             </a:fld>
             <a:endParaRPr lang="ru-RU"/>
           </a:p>
@@ -8921,9 +9279,9 @@
           <a:bodyPr/>
           <a:lstStyle/>
           <a:p>
-            <a:fld id="{49836411-3652-416A-A19E-8993570B20D4}" type="datetimeFigureOut">
+            <a:fld id="{70DDAB75-6A6C-4724-BDE6-4501BB847D49}" type="datetime1">
               <a:rPr lang="ru-RU" smtClean="0"/>
-              <a:t>19.06.2018</a:t>
+              <a:t>23.06.2018</a:t>
             </a:fld>
             <a:endParaRPr lang="ru-RU"/>
           </a:p>
@@ -9331,9 +9689,9 @@
           <a:bodyPr/>
           <a:lstStyle/>
           <a:p>
-            <a:fld id="{49836411-3652-416A-A19E-8993570B20D4}" type="datetimeFigureOut">
+            <a:fld id="{2CFB671A-85DA-4AAB-ADC1-222A552E5400}" type="datetime1">
               <a:rPr lang="ru-RU" smtClean="0"/>
-              <a:t>19.06.2018</a:t>
+              <a:t>23.06.2018</a:t>
             </a:fld>
             <a:endParaRPr lang="ru-RU"/>
           </a:p>
@@ -9458,9 +9816,9 @@
           <a:bodyPr/>
           <a:lstStyle/>
           <a:p>
-            <a:fld id="{49836411-3652-416A-A19E-8993570B20D4}" type="datetimeFigureOut">
+            <a:fld id="{3195341F-3C93-4486-B7E5-92ADAFDC931C}" type="datetime1">
               <a:rPr lang="ru-RU" smtClean="0"/>
-              <a:t>19.06.2018</a:t>
+              <a:t>23.06.2018</a:t>
             </a:fld>
             <a:endParaRPr lang="ru-RU"/>
           </a:p>
@@ -9553,9 +9911,9 @@
           <a:bodyPr/>
           <a:lstStyle/>
           <a:p>
-            <a:fld id="{49836411-3652-416A-A19E-8993570B20D4}" type="datetimeFigureOut">
+            <a:fld id="{B730EDCF-418D-4321-B069-D15ECE112F14}" type="datetime1">
               <a:rPr lang="ru-RU" smtClean="0"/>
-              <a:t>19.06.2018</a:t>
+              <a:t>23.06.2018</a:t>
             </a:fld>
             <a:endParaRPr lang="ru-RU"/>
           </a:p>
@@ -10634,9 +10992,9 @@
           <a:bodyPr/>
           <a:lstStyle/>
           <a:p>
-            <a:fld id="{49836411-3652-416A-A19E-8993570B20D4}" type="datetimeFigureOut">
+            <a:fld id="{30CC2BA9-7D3B-4B27-B338-E418E1F0E626}" type="datetime1">
               <a:rPr lang="ru-RU" smtClean="0"/>
-              <a:t>19.06.2018</a:t>
+              <a:t>23.06.2018</a:t>
             </a:fld>
             <a:endParaRPr lang="ru-RU"/>
           </a:p>
@@ -11742,9 +12100,9 @@
           <a:bodyPr/>
           <a:lstStyle/>
           <a:p>
-            <a:fld id="{49836411-3652-416A-A19E-8993570B20D4}" type="datetimeFigureOut">
+            <a:fld id="{70F4A56B-4F57-472F-B3AE-11DEE44570B9}" type="datetime1">
               <a:rPr lang="ru-RU" smtClean="0"/>
-              <a:t>19.06.2018</a:t>
+              <a:t>23.06.2018</a:t>
             </a:fld>
             <a:endParaRPr lang="ru-RU"/>
           </a:p>
@@ -12739,9 +13097,9 @@
             </a:lvl1pPr>
           </a:lstStyle>
           <a:p>
-            <a:fld id="{49836411-3652-416A-A19E-8993570B20D4}" type="datetimeFigureOut">
+            <a:fld id="{0BA50A6D-B2AD-4126-B2A7-833128D59F13}" type="datetime1">
               <a:rPr lang="ru-RU" smtClean="0"/>
-              <a:t>19.06.2018</a:t>
+              <a:t>23.06.2018</a:t>
             </a:fld>
             <a:endParaRPr lang="ru-RU"/>
           </a:p>
@@ -12884,6 +13242,7 @@
     <p:sldLayoutId id="2147483676" r:id="rId16"/>
     <p:sldLayoutId id="2147483677" r:id="rId17"/>
   </p:sldLayoutIdLst>
+  <p:hf hdr="0" ftr="0" dt="0"/>
   <p:txStyles>
     <p:titleStyle>
       <a:lvl1pPr algn="l" defTabSz="457200" rtl="0" eaLnBrk="1" latinLnBrk="0" hangingPunct="1">
@@ -13411,6 +13770,29 @@
           </a:p>
         </p:txBody>
       </p:sp>
+      <p:sp>
+        <p:nvSpPr>
+          <p:cNvPr id="4" name="Номер слайда 3"/>
+          <p:cNvSpPr>
+            <a:spLocks noGrp="1"/>
+          </p:cNvSpPr>
+          <p:nvPr>
+            <p:ph type="sldNum" sz="quarter" idx="12"/>
+          </p:nvPr>
+        </p:nvSpPr>
+        <p:spPr/>
+        <p:txBody>
+          <a:bodyPr/>
+          <a:lstStyle/>
+          <a:p>
+            <a:fld id="{8909925F-0AE6-4482-8591-DD2D52B36D50}" type="slidenum">
+              <a:rPr lang="ru-RU" smtClean="0"/>
+              <a:t>1</a:t>
+            </a:fld>
+            <a:endParaRPr lang="ru-RU"/>
+          </a:p>
+        </p:txBody>
+      </p:sp>
     </p:spTree>
     <p:extLst>
       <p:ext uri="{BB962C8B-B14F-4D97-AF65-F5344CB8AC3E}">
@@ -13421,98 +13803,17 @@
   <p:clrMapOvr>
     <a:masterClrMapping/>
   </p:clrMapOvr>
+  <p:timing>
+    <p:tnLst>
+      <p:par>
+        <p:cTn id="1" dur="indefinite" restart="never" nodeType="tmRoot"/>
+      </p:par>
+    </p:tnLst>
+  </p:timing>
 </p:sld>
 </file>
 
 <file path=ppt/slides/slide10.xml><?xml version="1.0" encoding="utf-8"?>
-<p:sld xmlns:a="http://schemas.openxmlformats.org/drawingml/2006/main" xmlns:r="http://schemas.openxmlformats.org/officeDocument/2006/relationships" xmlns:p="http://schemas.openxmlformats.org/presentationml/2006/main">
-  <p:cSld>
-    <p:spTree>
-      <p:nvGrpSpPr>
-        <p:cNvPr id="1" name=""/>
-        <p:cNvGrpSpPr/>
-        <p:nvPr/>
-      </p:nvGrpSpPr>
-      <p:grpSpPr>
-        <a:xfrm>
-          <a:off x="0" y="0"/>
-          <a:ext cx="0" cy="0"/>
-          <a:chOff x="0" y="0"/>
-          <a:chExt cx="0" cy="0"/>
-        </a:xfrm>
-      </p:grpSpPr>
-      <p:sp>
-        <p:nvSpPr>
-          <p:cNvPr id="2" name="Заголовок 1"/>
-          <p:cNvSpPr>
-            <a:spLocks noGrp="1"/>
-          </p:cNvSpPr>
-          <p:nvPr>
-            <p:ph type="title"/>
-          </p:nvPr>
-        </p:nvSpPr>
-        <p:spPr>
-          <a:xfrm>
-            <a:off x="1154954" y="973668"/>
-            <a:ext cx="8761413" cy="1083732"/>
-          </a:xfrm>
-        </p:spPr>
-        <p:txBody>
-          <a:bodyPr/>
-          <a:lstStyle/>
-          <a:p>
-            <a:pPr algn="ctr"/>
-            <a:r>
-              <a:rPr lang="ru-RU" dirty="0" smtClean="0"/>
-              <a:t>Управление яркостью при помощи ШИМ</a:t>
-            </a:r>
-            <a:endParaRPr lang="ru-RU" dirty="0"/>
-          </a:p>
-        </p:txBody>
-      </p:sp>
-      <p:pic>
-        <p:nvPicPr>
-          <p:cNvPr id="6" name="Объект 5"/>
-          <p:cNvPicPr>
-            <a:picLocks noGrp="1" noChangeAspect="1"/>
-          </p:cNvPicPr>
-          <p:nvPr>
-            <p:ph idx="1"/>
-          </p:nvPr>
-        </p:nvPicPr>
-        <p:blipFill>
-          <a:blip r:embed="rId2" cstate="print">
-            <a:extLst>
-              <a:ext uri="{28A0092B-C50C-407E-A947-70E740481C1C}">
-                <a14:useLocalDpi xmlns:a14="http://schemas.microsoft.com/office/drawing/2010/main" val="0"/>
-              </a:ext>
-            </a:extLst>
-          </a:blip>
-          <a:stretch>
-            <a:fillRect/>
-          </a:stretch>
-        </p:blipFill>
-        <p:spPr>
-          <a:xfrm>
-            <a:off x="3145536" y="2188234"/>
-            <a:ext cx="5788152" cy="4669766"/>
-          </a:xfrm>
-        </p:spPr>
-      </p:pic>
-    </p:spTree>
-    <p:extLst>
-      <p:ext uri="{BB962C8B-B14F-4D97-AF65-F5344CB8AC3E}">
-        <p14:creationId xmlns:p14="http://schemas.microsoft.com/office/powerpoint/2010/main" val="4273982296"/>
-      </p:ext>
-    </p:extLst>
-  </p:cSld>
-  <p:clrMapOvr>
-    <a:masterClrMapping/>
-  </p:clrMapOvr>
-</p:sld>
-</file>
-
-<file path=ppt/slides/slide11.xml><?xml version="1.0" encoding="utf-8"?>
 <p:sld xmlns:a="http://schemas.openxmlformats.org/drawingml/2006/main" xmlns:r="http://schemas.openxmlformats.org/officeDocument/2006/relationships" xmlns:p="http://schemas.openxmlformats.org/presentationml/2006/main">
   <p:cSld>
     <p:spTree>
@@ -13626,7 +13927,6 @@
               <a:rPr lang="ru-RU" dirty="0"/>
               <a:t>Так как изменение сопротивления фоторезистора при освещении значительно, то с помощью АЦП можно легко фиксировать наступление темноты или включение освещения. </a:t>
             </a:r>
-            <a:endParaRPr lang="ru-RU" dirty="0"/>
           </a:p>
         </p:txBody>
       </p:sp>
@@ -13660,6 +13960,29 @@
           </a:prstGeom>
         </p:spPr>
       </p:pic>
+      <p:sp>
+        <p:nvSpPr>
+          <p:cNvPr id="3" name="Номер слайда 2"/>
+          <p:cNvSpPr>
+            <a:spLocks noGrp="1"/>
+          </p:cNvSpPr>
+          <p:nvPr>
+            <p:ph type="sldNum" sz="quarter" idx="12"/>
+          </p:nvPr>
+        </p:nvSpPr>
+        <p:spPr/>
+        <p:txBody>
+          <a:bodyPr/>
+          <a:lstStyle/>
+          <a:p>
+            <a:fld id="{8909925F-0AE6-4482-8591-DD2D52B36D50}" type="slidenum">
+              <a:rPr lang="ru-RU" smtClean="0"/>
+              <a:t>10</a:t>
+            </a:fld>
+            <a:endParaRPr lang="ru-RU"/>
+          </a:p>
+        </p:txBody>
+      </p:sp>
     </p:spTree>
     <p:extLst>
       <p:ext uri="{BB962C8B-B14F-4D97-AF65-F5344CB8AC3E}">
@@ -13670,6 +13993,183 @@
   <p:clrMapOvr>
     <a:masterClrMapping/>
   </p:clrMapOvr>
+  <p:timing>
+    <p:tnLst>
+      <p:par>
+        <p:cTn id="1" dur="indefinite" restart="never" nodeType="tmRoot"/>
+      </p:par>
+    </p:tnLst>
+  </p:timing>
+</p:sld>
+</file>
+
+<file path=ppt/slides/slide11.xml><?xml version="1.0" encoding="utf-8"?>
+<p:sld xmlns:a="http://schemas.openxmlformats.org/drawingml/2006/main" xmlns:r="http://schemas.openxmlformats.org/officeDocument/2006/relationships" xmlns:p="http://schemas.openxmlformats.org/presentationml/2006/main">
+  <p:cSld>
+    <p:spTree>
+      <p:nvGrpSpPr>
+        <p:cNvPr id="1" name=""/>
+        <p:cNvGrpSpPr/>
+        <p:nvPr/>
+      </p:nvGrpSpPr>
+      <p:grpSpPr>
+        <a:xfrm>
+          <a:off x="0" y="0"/>
+          <a:ext cx="0" cy="0"/>
+          <a:chOff x="0" y="0"/>
+          <a:chExt cx="0" cy="0"/>
+        </a:xfrm>
+      </p:grpSpPr>
+      <p:pic>
+        <p:nvPicPr>
+          <p:cNvPr id="4" name="Рисунок 3"/>
+          <p:cNvPicPr>
+            <a:picLocks noChangeAspect="1"/>
+          </p:cNvPicPr>
+          <p:nvPr/>
+        </p:nvPicPr>
+        <p:blipFill>
+          <a:blip r:embed="rId2">
+            <a:extLst>
+              <a:ext uri="{28A0092B-C50C-407E-A947-70E740481C1C}">
+                <a14:useLocalDpi xmlns:a14="http://schemas.microsoft.com/office/drawing/2010/main" val="0"/>
+              </a:ext>
+            </a:extLst>
+          </a:blip>
+          <a:stretch>
+            <a:fillRect/>
+          </a:stretch>
+        </p:blipFill>
+        <p:spPr>
+          <a:xfrm>
+            <a:off x="7731061" y="2395729"/>
+            <a:ext cx="3816096" cy="3816096"/>
+          </a:xfrm>
+          <a:prstGeom prst="rect">
+            <a:avLst/>
+          </a:prstGeom>
+        </p:spPr>
+      </p:pic>
+      <p:sp>
+        <p:nvSpPr>
+          <p:cNvPr id="2" name="Заголовок 1"/>
+          <p:cNvSpPr>
+            <a:spLocks noGrp="1"/>
+          </p:cNvSpPr>
+          <p:nvPr>
+            <p:ph type="title"/>
+          </p:nvPr>
+        </p:nvSpPr>
+        <p:spPr/>
+        <p:txBody>
+          <a:bodyPr/>
+          <a:lstStyle/>
+          <a:p>
+            <a:r>
+              <a:rPr lang="en-US" dirty="0" smtClean="0"/>
+              <a:t>ESP8266-01. </a:t>
+            </a:r>
+            <a:r>
+              <a:rPr lang="ru-RU" dirty="0" smtClean="0"/>
+              <a:t>Шаги по настройке</a:t>
+            </a:r>
+            <a:endParaRPr lang="ru-RU" dirty="0"/>
+          </a:p>
+        </p:txBody>
+      </p:sp>
+      <p:sp>
+        <p:nvSpPr>
+          <p:cNvPr id="3" name="Объект 2"/>
+          <p:cNvSpPr>
+            <a:spLocks noGrp="1"/>
+          </p:cNvSpPr>
+          <p:nvPr>
+            <p:ph idx="1"/>
+          </p:nvPr>
+        </p:nvSpPr>
+        <p:spPr/>
+        <p:txBody>
+          <a:bodyPr/>
+          <a:lstStyle/>
+          <a:p>
+            <a:pPr>
+              <a:buFont typeface="+mj-lt"/>
+              <a:buAutoNum type="arabicPeriod"/>
+            </a:pPr>
+            <a:r>
+              <a:rPr lang="ru-RU" dirty="0" smtClean="0"/>
+              <a:t>При помощи АТ-команд конфигурирует в режим </a:t>
+            </a:r>
+            <a:r>
+              <a:rPr lang="en-US" dirty="0" smtClean="0"/>
+              <a:t>TCP </a:t>
+            </a:r>
+            <a:r>
+              <a:rPr lang="ru-RU" dirty="0" smtClean="0"/>
+              <a:t>сервера и подключаем к существующей сети</a:t>
+            </a:r>
+          </a:p>
+          <a:p>
+            <a:pPr>
+              <a:buFont typeface="+mj-lt"/>
+              <a:buAutoNum type="arabicPeriod"/>
+            </a:pPr>
+            <a:r>
+              <a:rPr lang="ru-RU" dirty="0" smtClean="0"/>
+              <a:t>Подключаем через </a:t>
+            </a:r>
+            <a:r>
+              <a:rPr lang="en-US" dirty="0" smtClean="0"/>
+              <a:t>UART </a:t>
+            </a:r>
+            <a:r>
+              <a:rPr lang="ru-RU" dirty="0" smtClean="0"/>
+              <a:t>к микроконтроллеру</a:t>
+            </a:r>
+            <a:endParaRPr lang="ru-RU" dirty="0"/>
+          </a:p>
+        </p:txBody>
+      </p:sp>
+      <p:sp>
+        <p:nvSpPr>
+          <p:cNvPr id="5" name="Номер слайда 4"/>
+          <p:cNvSpPr>
+            <a:spLocks noGrp="1"/>
+          </p:cNvSpPr>
+          <p:nvPr>
+            <p:ph type="sldNum" sz="quarter" idx="12"/>
+          </p:nvPr>
+        </p:nvSpPr>
+        <p:spPr/>
+        <p:txBody>
+          <a:bodyPr/>
+          <a:lstStyle/>
+          <a:p>
+            <a:fld id="{8909925F-0AE6-4482-8591-DD2D52B36D50}" type="slidenum">
+              <a:rPr lang="ru-RU" smtClean="0"/>
+              <a:t>11</a:t>
+            </a:fld>
+            <a:endParaRPr lang="ru-RU"/>
+          </a:p>
+        </p:txBody>
+      </p:sp>
+    </p:spTree>
+    <p:extLst>
+      <p:ext uri="{BB962C8B-B14F-4D97-AF65-F5344CB8AC3E}">
+        <p14:creationId xmlns:p14="http://schemas.microsoft.com/office/powerpoint/2010/main" val="3816176970"/>
+      </p:ext>
+    </p:extLst>
+  </p:cSld>
+  <p:clrMapOvr>
+    <a:masterClrMapping/>
+  </p:clrMapOvr>
+  <p:timing>
+    <p:tnLst>
+      <p:par>
+        <p:cTn id="1" dur="indefinite" restart="never" nodeType="tmRoot"/>
+      </p:par>
+    </p:tnLst>
+  </p:timing>
 </p:sld>
 </file>
 
@@ -13840,7 +14340,7 @@
             </a:r>
             <a:r>
               <a:rPr lang="ru-RU" dirty="0" smtClean="0"/>
-              <a:t>. Состоит 9 из </a:t>
+              <a:t>. Состоит из 9 </a:t>
             </a:r>
             <a:r>
               <a:rPr lang="en-US" dirty="0" smtClean="0"/>
@@ -13871,6 +14371,29 @@
               <a:t> </a:t>
             </a:r>
             <a:endParaRPr lang="ru-RU" dirty="0"/>
+          </a:p>
+        </p:txBody>
+      </p:sp>
+      <p:sp>
+        <p:nvSpPr>
+          <p:cNvPr id="4" name="Номер слайда 3"/>
+          <p:cNvSpPr>
+            <a:spLocks noGrp="1"/>
+          </p:cNvSpPr>
+          <p:nvPr>
+            <p:ph type="sldNum" sz="quarter" idx="12"/>
+          </p:nvPr>
+        </p:nvSpPr>
+        <p:spPr/>
+        <p:txBody>
+          <a:bodyPr/>
+          <a:lstStyle/>
+          <a:p>
+            <a:fld id="{8909925F-0AE6-4482-8591-DD2D52B36D50}" type="slidenum">
+              <a:rPr lang="ru-RU" smtClean="0"/>
+              <a:t>12</a:t>
+            </a:fld>
+            <a:endParaRPr lang="ru-RU"/>
           </a:p>
         </p:txBody>
       </p:sp>
@@ -13884,6 +14407,13 @@
   <p:clrMapOvr>
     <a:masterClrMapping/>
   </p:clrMapOvr>
+  <p:timing>
+    <p:tnLst>
+      <p:par>
+        <p:cTn id="1" dur="indefinite" restart="never" nodeType="tmRoot"/>
+      </p:par>
+    </p:tnLst>
+  </p:timing>
 </p:sld>
 </file>
 
@@ -13923,6 +14453,55 @@
             <a:r>
               <a:rPr lang="ru-RU" dirty="0" smtClean="0"/>
               <a:t>Себестоимость системы</a:t>
+            </a:r>
+            <a:endParaRPr lang="ru-RU" dirty="0"/>
+          </a:p>
+        </p:txBody>
+      </p:sp>
+      <p:sp>
+        <p:nvSpPr>
+          <p:cNvPr id="5" name="Прямоугольник 4"/>
+          <p:cNvSpPr/>
+          <p:nvPr/>
+        </p:nvSpPr>
+        <p:spPr>
+          <a:xfrm>
+            <a:off x="502666" y="5512046"/>
+            <a:ext cx="2424062" cy="369332"/>
+          </a:xfrm>
+          <a:prstGeom prst="rect">
+            <a:avLst/>
+          </a:prstGeom>
+        </p:spPr>
+        <p:txBody>
+          <a:bodyPr wrap="none">
+            <a:spAutoFit/>
+          </a:bodyPr>
+          <a:lstStyle/>
+          <a:p>
+            <a:r>
+              <a:rPr lang="ru-RU" dirty="0">
+                <a:solidFill>
+                  <a:srgbClr val="000000"/>
+                </a:solidFill>
+              </a:rPr>
+              <a:t>Итого </a:t>
+            </a:r>
+            <a:r>
+              <a:rPr lang="ru-RU" sz="1400" dirty="0"/>
+              <a:t>598.07</a:t>
+            </a:r>
+            <a:r>
+              <a:rPr lang="ru-RU" dirty="0"/>
+              <a:t> </a:t>
+            </a:r>
+            <a:r>
+              <a:rPr lang="ru-RU" dirty="0" smtClean="0">
+                <a:solidFill>
+                  <a:srgbClr val="000000"/>
+                </a:solidFill>
+              </a:rPr>
+              <a:t>рублей </a:t>
             </a:r>
             <a:endParaRPr lang="ru-RU" dirty="0"/>
           </a:p>
@@ -13952,42 +14531,31 @@
         </p:blipFill>
         <p:spPr>
           <a:xfrm>
-            <a:off x="502666" y="2866983"/>
-            <a:ext cx="7010400" cy="2533650"/>
+            <a:off x="502666" y="2949821"/>
+            <a:ext cx="6162675" cy="2562225"/>
           </a:xfrm>
         </p:spPr>
       </p:pic>
       <p:sp>
         <p:nvSpPr>
-          <p:cNvPr id="5" name="Прямоугольник 4"/>
-          <p:cNvSpPr/>
-          <p:nvPr/>
-        </p:nvSpPr>
-        <p:spPr>
-          <a:xfrm>
-            <a:off x="502666" y="5512046"/>
-            <a:ext cx="2254400" cy="369332"/>
-          </a:xfrm>
-          <a:prstGeom prst="rect">
-            <a:avLst/>
-          </a:prstGeom>
-        </p:spPr>
+          <p:cNvPr id="3" name="Номер слайда 2"/>
+          <p:cNvSpPr>
+            <a:spLocks noGrp="1"/>
+          </p:cNvSpPr>
+          <p:nvPr>
+            <p:ph type="sldNum" sz="quarter" idx="12"/>
+          </p:nvPr>
+        </p:nvSpPr>
+        <p:spPr/>
         <p:txBody>
-          <a:bodyPr wrap="none">
-            <a:spAutoFit/>
-          </a:bodyPr>
+          <a:bodyPr/>
           <a:lstStyle/>
           <a:p>
-            <a:r>
-              <a:rPr lang="ru-RU" dirty="0">
-                <a:solidFill>
-                  <a:srgbClr val="000000"/>
-                </a:solidFill>
-                <a:latin typeface="Times New Roman" panose="02020603050405020304" pitchFamily="18" charset="0"/>
-              </a:rPr>
-              <a:t>Итого 555.07 рублей </a:t>
-            </a:r>
-            <a:endParaRPr lang="ru-RU" dirty="0"/>
+            <a:fld id="{8909925F-0AE6-4482-8591-DD2D52B36D50}" type="slidenum">
+              <a:rPr lang="ru-RU" smtClean="0"/>
+              <a:t>13</a:t>
+            </a:fld>
+            <a:endParaRPr lang="ru-RU"/>
           </a:p>
         </p:txBody>
       </p:sp>
@@ -14001,6 +14569,13 @@
   <p:clrMapOvr>
     <a:masterClrMapping/>
   </p:clrMapOvr>
+  <p:timing>
+    <p:tnLst>
+      <p:par>
+        <p:cTn id="1" dur="indefinite" restart="never" nodeType="tmRoot"/>
+      </p:par>
+    </p:tnLst>
+  </p:timing>
 </p:sld>
 </file>
 
@@ -14126,9 +14701,39 @@
             </a:pPr>
             <a:r>
               <a:rPr lang="ru-RU" dirty="0"/>
-              <a:t>Таким образом, спроектированная система удовлетворяет всем начальным условиям, и обладает при этом дешевизной, простотой реализации и эксплуатации.</a:t>
-            </a:r>
-            <a:endParaRPr lang="ru-RU" dirty="0"/>
+              <a:t>Таким образом, спроектированная система удовлетворяет всем начальным условиям, и </a:t>
+            </a:r>
+            <a:r>
+              <a:rPr lang="ru-RU" dirty="0" smtClean="0"/>
+              <a:t>обладает </a:t>
+            </a:r>
+            <a:r>
+              <a:rPr lang="ru-RU" dirty="0"/>
+              <a:t>дешевизной, простотой реализации и эксплуатации.</a:t>
+            </a:r>
+          </a:p>
+        </p:txBody>
+      </p:sp>
+      <p:sp>
+        <p:nvSpPr>
+          <p:cNvPr id="4" name="Номер слайда 3"/>
+          <p:cNvSpPr>
+            <a:spLocks noGrp="1"/>
+          </p:cNvSpPr>
+          <p:nvPr>
+            <p:ph type="sldNum" sz="quarter" idx="12"/>
+          </p:nvPr>
+        </p:nvSpPr>
+        <p:spPr/>
+        <p:txBody>
+          <a:bodyPr/>
+          <a:lstStyle/>
+          <a:p>
+            <a:fld id="{8909925F-0AE6-4482-8591-DD2D52B36D50}" type="slidenum">
+              <a:rPr lang="ru-RU" smtClean="0"/>
+              <a:t>14</a:t>
+            </a:fld>
+            <a:endParaRPr lang="ru-RU"/>
           </a:p>
         </p:txBody>
       </p:sp>
@@ -14142,6 +14747,13 @@
   <p:clrMapOvr>
     <a:masterClrMapping/>
   </p:clrMapOvr>
+  <p:timing>
+    <p:tnLst>
+      <p:par>
+        <p:cTn id="1" dur="indefinite" restart="never" nodeType="tmRoot"/>
+      </p:par>
+    </p:tnLst>
+  </p:timing>
 </p:sld>
 </file>
 
@@ -14224,16 +14836,13 @@
                   <a:schemeClr val="bg1"/>
                 </a:solidFill>
               </a:rPr>
-              <a:t>. гибкость </a:t>
-            </a:r>
-            <a:r>
-              <a:rPr lang="ru-RU" dirty="0">
-                <a:solidFill>
-                  <a:schemeClr val="bg1"/>
-                </a:solidFill>
-              </a:rPr>
-              <a:t>(легкость, а также простота использования, возможность настройки) </a:t>
-            </a:r>
+              <a:t>. простота использования</a:t>
+            </a:r>
+            <a:endParaRPr lang="ru-RU" dirty="0">
+              <a:solidFill>
+                <a:schemeClr val="bg1"/>
+              </a:solidFill>
+            </a:endParaRPr>
           </a:p>
           <a:p>
             <a:r>
@@ -14252,40 +14861,21 @@
               </a:rPr>
               <a:t>. надежность </a:t>
             </a:r>
-            <a:r>
-              <a:rPr lang="ru-RU" dirty="0">
-                <a:solidFill>
-                  <a:schemeClr val="bg1"/>
-                </a:solidFill>
-              </a:rPr>
-              <a:t>(автоматический контроль над состояниями системы) </a:t>
-            </a:r>
-          </a:p>
-          <a:p>
-            <a:r>
-              <a:rPr lang="ru-RU" dirty="0">
-                <a:solidFill>
-                  <a:schemeClr val="bg1"/>
-                </a:solidFill>
-              </a:rPr>
-              <a:t>3</a:t>
-            </a:r>
+          </a:p>
+          <a:p>
             <a:r>
               <a:rPr lang="ru-RU" dirty="0" smtClean="0">
                 <a:solidFill>
                   <a:schemeClr val="bg1"/>
                 </a:solidFill>
               </a:rPr>
-              <a:t>. высокая </a:t>
-            </a:r>
-            <a:r>
-              <a:rPr lang="ru-RU" dirty="0">
-                <a:solidFill>
-                  <a:schemeClr val="bg1"/>
-                </a:solidFill>
-              </a:rPr>
-              <a:t>функциональная возможность и простота в обращении </a:t>
-            </a:r>
+              <a:t>3. Функциональность </a:t>
+            </a:r>
+            <a:endParaRPr lang="ru-RU" dirty="0">
+              <a:solidFill>
+                <a:schemeClr val="bg1"/>
+              </a:solidFill>
+            </a:endParaRPr>
           </a:p>
           <a:p>
             <a:r>
@@ -14302,47 +14892,36 @@
                   <a:schemeClr val="bg1"/>
                 </a:solidFill>
               </a:rPr>
-              <a:t>. маленькой </a:t>
-            </a:r>
-            <a:r>
-              <a:rPr lang="ru-RU" dirty="0">
-                <a:solidFill>
-                  <a:schemeClr val="bg1"/>
-                </a:solidFill>
-              </a:rPr>
-              <a:t>себестоимостью, большой экономичностью </a:t>
-            </a:r>
-          </a:p>
-          <a:p>
-            <a:r>
-              <a:rPr lang="ru-RU" dirty="0">
-                <a:solidFill>
-                  <a:schemeClr val="bg1"/>
-                </a:solidFill>
-              </a:rPr>
-              <a:t>5</a:t>
-            </a:r>
-            <a:r>
-              <a:rPr lang="ru-RU" dirty="0" smtClean="0">
-                <a:solidFill>
-                  <a:schemeClr val="bg1"/>
-                </a:solidFill>
-              </a:rPr>
-              <a:t>. Безопасность </a:t>
-            </a:r>
-            <a:r>
-              <a:rPr lang="ru-RU" dirty="0">
-                <a:solidFill>
-                  <a:schemeClr val="bg1"/>
-                </a:solidFill>
-              </a:rPr>
-              <a:t>использования </a:t>
+              <a:t>. Низкая себестоимость</a:t>
             </a:r>
             <a:endParaRPr lang="ru-RU" dirty="0">
               <a:solidFill>
                 <a:schemeClr val="bg1"/>
               </a:solidFill>
             </a:endParaRPr>
+          </a:p>
+        </p:txBody>
+      </p:sp>
+      <p:sp>
+        <p:nvSpPr>
+          <p:cNvPr id="4" name="Номер слайда 3"/>
+          <p:cNvSpPr>
+            <a:spLocks noGrp="1"/>
+          </p:cNvSpPr>
+          <p:nvPr>
+            <p:ph type="sldNum" sz="quarter" idx="12"/>
+          </p:nvPr>
+        </p:nvSpPr>
+        <p:spPr/>
+        <p:txBody>
+          <a:bodyPr/>
+          <a:lstStyle/>
+          <a:p>
+            <a:fld id="{8909925F-0AE6-4482-8591-DD2D52B36D50}" type="slidenum">
+              <a:rPr lang="ru-RU" smtClean="0"/>
+              <a:t>2</a:t>
+            </a:fld>
+            <a:endParaRPr lang="ru-RU"/>
           </a:p>
         </p:txBody>
       </p:sp>
@@ -14356,6 +14935,13 @@
   <p:clrMapOvr>
     <a:masterClrMapping/>
   </p:clrMapOvr>
+  <p:timing>
+    <p:tnLst>
+      <p:par>
+        <p:cTn id="1" dur="indefinite" restart="never" nodeType="tmRoot"/>
+      </p:par>
+    </p:tnLst>
+  </p:timing>
 </p:sld>
 </file>
 
@@ -14398,7 +14984,7 @@
         </p:blipFill>
         <p:spPr>
           <a:xfrm>
-            <a:off x="6300216" y="2304288"/>
+            <a:off x="5934456" y="2301748"/>
             <a:ext cx="5779008" cy="4375291"/>
           </a:xfrm>
           <a:prstGeom prst="rect">
@@ -14469,6 +15055,29 @@
               <a:t>3. Дистанционное управление </a:t>
             </a:r>
             <a:endParaRPr lang="ru-RU" dirty="0"/>
+          </a:p>
+        </p:txBody>
+      </p:sp>
+      <p:sp>
+        <p:nvSpPr>
+          <p:cNvPr id="4" name="Номер слайда 3"/>
+          <p:cNvSpPr>
+            <a:spLocks noGrp="1"/>
+          </p:cNvSpPr>
+          <p:nvPr>
+            <p:ph type="sldNum" sz="quarter" idx="12"/>
+          </p:nvPr>
+        </p:nvSpPr>
+        <p:spPr/>
+        <p:txBody>
+          <a:bodyPr/>
+          <a:lstStyle/>
+          <a:p>
+            <a:fld id="{8909925F-0AE6-4482-8591-DD2D52B36D50}" type="slidenum">
+              <a:rPr lang="ru-RU" smtClean="0"/>
+              <a:t>3</a:t>
+            </a:fld>
+            <a:endParaRPr lang="ru-RU"/>
           </a:p>
         </p:txBody>
       </p:sp>
@@ -14482,6 +15091,13 @@
   <p:clrMapOvr>
     <a:masterClrMapping/>
   </p:clrMapOvr>
+  <p:timing>
+    <p:tnLst>
+      <p:par>
+        <p:cTn id="1" dur="indefinite" restart="never" nodeType="tmRoot"/>
+      </p:par>
+    </p:tnLst>
+  </p:timing>
 </p:sld>
 </file>
 
@@ -14663,6 +15279,29 @@
           </a:prstGeom>
         </p:spPr>
       </p:pic>
+      <p:sp>
+        <p:nvSpPr>
+          <p:cNvPr id="7" name="Номер слайда 6"/>
+          <p:cNvSpPr>
+            <a:spLocks noGrp="1"/>
+          </p:cNvSpPr>
+          <p:nvPr>
+            <p:ph type="sldNum" sz="quarter" idx="12"/>
+          </p:nvPr>
+        </p:nvSpPr>
+        <p:spPr/>
+        <p:txBody>
+          <a:bodyPr/>
+          <a:lstStyle/>
+          <a:p>
+            <a:fld id="{8909925F-0AE6-4482-8591-DD2D52B36D50}" type="slidenum">
+              <a:rPr lang="ru-RU" smtClean="0"/>
+              <a:t>4</a:t>
+            </a:fld>
+            <a:endParaRPr lang="ru-RU"/>
+          </a:p>
+        </p:txBody>
+      </p:sp>
     </p:spTree>
     <p:extLst>
       <p:ext uri="{BB962C8B-B14F-4D97-AF65-F5344CB8AC3E}">
@@ -14673,10 +15312,313 @@
   <p:clrMapOvr>
     <a:masterClrMapping/>
   </p:clrMapOvr>
+  <p:timing>
+    <p:tnLst>
+      <p:par>
+        <p:cTn id="1" dur="indefinite" restart="never" nodeType="tmRoot"/>
+      </p:par>
+    </p:tnLst>
+  </p:timing>
 </p:sld>
 </file>
 
 <file path=ppt/slides/slide5.xml><?xml version="1.0" encoding="utf-8"?>
+<p:sld xmlns:a="http://schemas.openxmlformats.org/drawingml/2006/main" xmlns:r="http://schemas.openxmlformats.org/officeDocument/2006/relationships" xmlns:p="http://schemas.openxmlformats.org/presentationml/2006/main">
+  <p:cSld>
+    <p:spTree>
+      <p:nvGrpSpPr>
+        <p:cNvPr id="1" name=""/>
+        <p:cNvGrpSpPr/>
+        <p:nvPr/>
+      </p:nvGrpSpPr>
+      <p:grpSpPr>
+        <a:xfrm>
+          <a:off x="0" y="0"/>
+          <a:ext cx="0" cy="0"/>
+          <a:chOff x="0" y="0"/>
+          <a:chExt cx="0" cy="0"/>
+        </a:xfrm>
+      </p:grpSpPr>
+      <p:sp>
+        <p:nvSpPr>
+          <p:cNvPr id="2" name="Заголовок 1"/>
+          <p:cNvSpPr>
+            <a:spLocks noGrp="1"/>
+          </p:cNvSpPr>
+          <p:nvPr>
+            <p:ph type="title"/>
+          </p:nvPr>
+        </p:nvSpPr>
+        <p:spPr/>
+        <p:txBody>
+          <a:bodyPr/>
+          <a:lstStyle/>
+          <a:p>
+            <a:r>
+              <a:rPr lang="en-US" dirty="0" smtClean="0"/>
+              <a:t>STM32F100. </a:t>
+            </a:r>
+            <a:r>
+              <a:rPr lang="ru-RU" dirty="0" smtClean="0"/>
+              <a:t>Основные параметры</a:t>
+            </a:r>
+            <a:endParaRPr lang="ru-RU" dirty="0"/>
+          </a:p>
+        </p:txBody>
+      </p:sp>
+      <p:sp>
+        <p:nvSpPr>
+          <p:cNvPr id="3" name="Объект 2"/>
+          <p:cNvSpPr>
+            <a:spLocks noGrp="1"/>
+          </p:cNvSpPr>
+          <p:nvPr>
+            <p:ph idx="1"/>
+          </p:nvPr>
+        </p:nvSpPr>
+        <p:spPr>
+          <a:xfrm>
+            <a:off x="1154954" y="2603500"/>
+            <a:ext cx="8825659" cy="3998468"/>
+          </a:xfrm>
+        </p:spPr>
+        <p:txBody>
+          <a:bodyPr>
+            <a:normAutofit fontScale="25000" lnSpcReduction="20000"/>
+          </a:bodyPr>
+          <a:lstStyle/>
+          <a:p>
+            <a:endParaRPr lang="ru-RU" dirty="0"/>
+          </a:p>
+          <a:p>
+            <a:r>
+              <a:rPr lang="ru-RU" sz="6400" dirty="0"/>
+              <a:t>Максимальная тактовая частота 24 МГц (30 DMIPS) </a:t>
+            </a:r>
+          </a:p>
+          <a:p>
+            <a:r>
+              <a:rPr lang="ru-RU" sz="6400" dirty="0" smtClean="0"/>
+              <a:t>Умножение </a:t>
+            </a:r>
+            <a:r>
+              <a:rPr lang="ru-RU" sz="6400" dirty="0"/>
+              <a:t>и деление за 1 такт </a:t>
+            </a:r>
+          </a:p>
+          <a:p>
+            <a:r>
+              <a:rPr lang="ru-RU" sz="6400" dirty="0" smtClean="0"/>
+              <a:t>Напряжения </a:t>
+            </a:r>
+            <a:r>
+              <a:rPr lang="ru-RU" sz="6400" dirty="0"/>
+              <a:t>питания 2.0 – 3.6 В </a:t>
+            </a:r>
+          </a:p>
+          <a:p>
+            <a:r>
+              <a:rPr lang="ru-RU" sz="6400" dirty="0" smtClean="0"/>
+              <a:t>От </a:t>
+            </a:r>
+            <a:r>
+              <a:rPr lang="ru-RU" sz="6400" dirty="0"/>
+              <a:t>16 до 128 Кб флэш-памяти </a:t>
+            </a:r>
+            <a:endParaRPr lang="ru-RU" sz="6400" dirty="0" smtClean="0"/>
+          </a:p>
+          <a:p>
+            <a:r>
+              <a:rPr lang="ru-RU" sz="6400" dirty="0"/>
+              <a:t>16-канальный 12-битный АЦП (1.2 </a:t>
+            </a:r>
+            <a:r>
+              <a:rPr lang="ru-RU" sz="6400" dirty="0" err="1"/>
+              <a:t>мкс</a:t>
+            </a:r>
+            <a:r>
+              <a:rPr lang="ru-RU" sz="6400" dirty="0"/>
+              <a:t>) с датчиком температуры </a:t>
+            </a:r>
+          </a:p>
+          <a:p>
+            <a:r>
+              <a:rPr lang="ru-RU" sz="6400" dirty="0"/>
+              <a:t>Два 12–битных ЦАП </a:t>
+            </a:r>
+            <a:endParaRPr lang="ru-RU" sz="6400" dirty="0" smtClean="0"/>
+          </a:p>
+          <a:p>
+            <a:r>
+              <a:rPr lang="ru-RU" sz="6400" dirty="0" smtClean="0"/>
+              <a:t>До </a:t>
+            </a:r>
+            <a:r>
+              <a:rPr lang="ru-RU" sz="6400" dirty="0"/>
+              <a:t>80 быстрых портов ввода – вывода (есть совместимость с 5 В) </a:t>
+            </a:r>
+          </a:p>
+          <a:p>
+            <a:r>
+              <a:rPr lang="ru-RU" sz="6400" dirty="0" smtClean="0"/>
+              <a:t>Два </a:t>
+            </a:r>
+            <a:r>
+              <a:rPr lang="ru-RU" sz="6400" dirty="0"/>
+              <a:t>сторожевых таймера (IWDG и WWDG) </a:t>
+            </a:r>
+          </a:p>
+          <a:p>
+            <a:r>
+              <a:rPr lang="ru-RU" sz="6400" dirty="0" smtClean="0"/>
+              <a:t>До </a:t>
+            </a:r>
+            <a:r>
+              <a:rPr lang="ru-RU" sz="6400" dirty="0"/>
+              <a:t>10 таймеров общего и расширенного назначений </a:t>
+            </a:r>
+          </a:p>
+          <a:p>
+            <a:r>
+              <a:rPr lang="ru-RU" sz="6400" dirty="0" smtClean="0"/>
+              <a:t>До </a:t>
+            </a:r>
+            <a:r>
+              <a:rPr lang="ru-RU" sz="6400" dirty="0"/>
+              <a:t>2х </a:t>
+            </a:r>
+            <a:r>
+              <a:rPr lang="en-US" sz="6400" dirty="0"/>
+              <a:t>I2C(</a:t>
+            </a:r>
+            <a:r>
+              <a:rPr lang="en-US" sz="6400" dirty="0" err="1"/>
+              <a:t>SMBus</a:t>
+            </a:r>
+            <a:r>
+              <a:rPr lang="en-US" sz="6400" dirty="0"/>
+              <a:t>/</a:t>
+            </a:r>
+            <a:r>
+              <a:rPr lang="en-US" sz="6400" dirty="0" err="1"/>
+              <a:t>PMBus</a:t>
+            </a:r>
+            <a:r>
+              <a:rPr lang="en-US" sz="6400" dirty="0"/>
+              <a:t>), </a:t>
+            </a:r>
+            <a:r>
+              <a:rPr lang="ru-RU" sz="6400" dirty="0"/>
+              <a:t>до 3х </a:t>
+            </a:r>
+            <a:r>
+              <a:rPr lang="en-US" sz="6400" dirty="0"/>
+              <a:t>USART (Lin, </a:t>
+            </a:r>
+            <a:r>
+              <a:rPr lang="en-US" sz="6400" dirty="0" err="1"/>
+              <a:t>IrDa</a:t>
+            </a:r>
+            <a:r>
+              <a:rPr lang="en-US" sz="6400" dirty="0"/>
+              <a:t>, modem control), </a:t>
+            </a:r>
+            <a:r>
+              <a:rPr lang="ru-RU" sz="6400" dirty="0"/>
+              <a:t>до 2 </a:t>
+            </a:r>
+            <a:r>
+              <a:rPr lang="en-US" sz="6400" dirty="0"/>
+              <a:t>SPI(2 </a:t>
+            </a:r>
+            <a:r>
+              <a:rPr lang="ru-RU" sz="6400" dirty="0"/>
+              <a:t>Мбит/с), </a:t>
+            </a:r>
+            <a:r>
+              <a:rPr lang="en-US" sz="6400" dirty="0"/>
+              <a:t>HDMI (CEC), RTC </a:t>
+            </a:r>
+          </a:p>
+          <a:p>
+            <a:endParaRPr lang="ru-RU" dirty="0"/>
+          </a:p>
+        </p:txBody>
+      </p:sp>
+      <p:pic>
+        <p:nvPicPr>
+          <p:cNvPr id="4" name="Рисунок 3"/>
+          <p:cNvPicPr>
+            <a:picLocks noChangeAspect="1"/>
+          </p:cNvPicPr>
+          <p:nvPr/>
+        </p:nvPicPr>
+        <p:blipFill>
+          <a:blip r:embed="rId2">
+            <a:extLst>
+              <a:ext uri="{28A0092B-C50C-407E-A947-70E740481C1C}">
+                <a14:useLocalDpi xmlns:a14="http://schemas.microsoft.com/office/drawing/2010/main" val="0"/>
+              </a:ext>
+            </a:extLst>
+          </a:blip>
+          <a:stretch>
+            <a:fillRect/>
+          </a:stretch>
+        </p:blipFill>
+        <p:spPr>
+          <a:xfrm>
+            <a:off x="8360911" y="2523744"/>
+            <a:ext cx="3770275" cy="3182112"/>
+          </a:xfrm>
+          <a:prstGeom prst="rect">
+            <a:avLst/>
+          </a:prstGeom>
+        </p:spPr>
+      </p:pic>
+      <p:sp>
+        <p:nvSpPr>
+          <p:cNvPr id="5" name="Номер слайда 4"/>
+          <p:cNvSpPr>
+            <a:spLocks noGrp="1"/>
+          </p:cNvSpPr>
+          <p:nvPr>
+            <p:ph type="sldNum" sz="quarter" idx="12"/>
+          </p:nvPr>
+        </p:nvSpPr>
+        <p:spPr/>
+        <p:txBody>
+          <a:bodyPr/>
+          <a:lstStyle/>
+          <a:p>
+            <a:fld id="{8909925F-0AE6-4482-8591-DD2D52B36D50}" type="slidenum">
+              <a:rPr lang="ru-RU" smtClean="0"/>
+              <a:t>5</a:t>
+            </a:fld>
+            <a:endParaRPr lang="ru-RU"/>
+          </a:p>
+        </p:txBody>
+      </p:sp>
+    </p:spTree>
+    <p:extLst>
+      <p:ext uri="{BB962C8B-B14F-4D97-AF65-F5344CB8AC3E}">
+        <p14:creationId xmlns:p14="http://schemas.microsoft.com/office/powerpoint/2010/main" val="2154210626"/>
+      </p:ext>
+    </p:extLst>
+  </p:cSld>
+  <p:clrMapOvr>
+    <a:masterClrMapping/>
+  </p:clrMapOvr>
+  <p:timing>
+    <p:tnLst>
+      <p:par>
+        <p:cTn id="1" dur="indefinite" restart="never" nodeType="tmRoot"/>
+      </p:par>
+    </p:tnLst>
+  </p:timing>
+</p:sld>
+</file>
+
+<file path=ppt/slides/slide6.xml><?xml version="1.0" encoding="utf-8"?>
 <p:sld xmlns:a="http://schemas.openxmlformats.org/drawingml/2006/main" xmlns:r="http://schemas.openxmlformats.org/officeDocument/2006/relationships" xmlns:p="http://schemas.openxmlformats.org/presentationml/2006/main">
   <p:cSld>
     <p:spTree>
@@ -14793,6 +15735,29 @@
           </a:prstGeom>
         </p:spPr>
       </p:pic>
+      <p:sp>
+        <p:nvSpPr>
+          <p:cNvPr id="4" name="Номер слайда 3"/>
+          <p:cNvSpPr>
+            <a:spLocks noGrp="1"/>
+          </p:cNvSpPr>
+          <p:nvPr>
+            <p:ph type="sldNum" sz="quarter" idx="12"/>
+          </p:nvPr>
+        </p:nvSpPr>
+        <p:spPr/>
+        <p:txBody>
+          <a:bodyPr/>
+          <a:lstStyle/>
+          <a:p>
+            <a:fld id="{8909925F-0AE6-4482-8591-DD2D52B36D50}" type="slidenum">
+              <a:rPr lang="ru-RU" smtClean="0"/>
+              <a:t>6</a:t>
+            </a:fld>
+            <a:endParaRPr lang="ru-RU"/>
+          </a:p>
+        </p:txBody>
+      </p:sp>
     </p:spTree>
     <p:extLst>
       <p:ext uri="{BB962C8B-B14F-4D97-AF65-F5344CB8AC3E}">
@@ -14803,102 +15768,13 @@
   <p:clrMapOvr>
     <a:masterClrMapping/>
   </p:clrMapOvr>
-</p:sld>
-</file>
-
-<file path=ppt/slides/slide6.xml><?xml version="1.0" encoding="utf-8"?>
-<p:sld xmlns:a="http://schemas.openxmlformats.org/drawingml/2006/main" xmlns:r="http://schemas.openxmlformats.org/officeDocument/2006/relationships" xmlns:p="http://schemas.openxmlformats.org/presentationml/2006/main">
-  <p:cSld>
-    <p:spTree>
-      <p:nvGrpSpPr>
-        <p:cNvPr id="1" name=""/>
-        <p:cNvGrpSpPr/>
-        <p:nvPr/>
-      </p:nvGrpSpPr>
-      <p:grpSpPr>
-        <a:xfrm>
-          <a:off x="0" y="0"/>
-          <a:ext cx="0" cy="0"/>
-          <a:chOff x="0" y="0"/>
-          <a:chExt cx="0" cy="0"/>
-        </a:xfrm>
-      </p:grpSpPr>
-      <p:sp>
-        <p:nvSpPr>
-          <p:cNvPr id="2" name="Заголовок 1"/>
-          <p:cNvSpPr>
-            <a:spLocks noGrp="1"/>
-          </p:cNvSpPr>
-          <p:nvPr>
-            <p:ph type="title"/>
-          </p:nvPr>
-        </p:nvSpPr>
-        <p:spPr/>
-        <p:txBody>
-          <a:bodyPr/>
-          <a:lstStyle/>
-          <a:p>
-            <a:r>
-              <a:rPr lang="ru-RU" dirty="0" smtClean="0"/>
-              <a:t>Функционал системы</a:t>
-            </a:r>
-            <a:endParaRPr lang="ru-RU" dirty="0"/>
-          </a:p>
-        </p:txBody>
-      </p:sp>
-      <p:sp>
-        <p:nvSpPr>
-          <p:cNvPr id="3" name="Объект 2"/>
-          <p:cNvSpPr>
-            <a:spLocks noGrp="1"/>
-          </p:cNvSpPr>
-          <p:nvPr>
-            <p:ph idx="1"/>
-          </p:nvPr>
-        </p:nvSpPr>
-        <p:spPr/>
-        <p:txBody>
-          <a:bodyPr/>
-          <a:lstStyle/>
-          <a:p>
-            <a:r>
-              <a:rPr lang="ru-RU" dirty="0" smtClean="0"/>
-              <a:t>Удаленное включение</a:t>
-            </a:r>
-            <a:r>
-              <a:rPr lang="en-US" dirty="0" smtClean="0"/>
-              <a:t>/</a:t>
-            </a:r>
-            <a:r>
-              <a:rPr lang="ru-RU" dirty="0" smtClean="0"/>
-              <a:t>выключение</a:t>
-            </a:r>
-          </a:p>
-          <a:p>
-            <a:r>
-              <a:rPr lang="ru-RU" dirty="0" smtClean="0"/>
-              <a:t>Регулировка яркости освещения </a:t>
-            </a:r>
-          </a:p>
-          <a:p>
-            <a:r>
-              <a:rPr lang="ru-RU" dirty="0" smtClean="0"/>
-              <a:t>Автоматическое включение/отключение </a:t>
-            </a:r>
-            <a:endParaRPr lang="ru-RU" dirty="0"/>
-          </a:p>
-        </p:txBody>
-      </p:sp>
-    </p:spTree>
-    <p:extLst>
-      <p:ext uri="{BB962C8B-B14F-4D97-AF65-F5344CB8AC3E}">
-        <p14:creationId xmlns:p14="http://schemas.microsoft.com/office/powerpoint/2010/main" val="2029710723"/>
-      </p:ext>
-    </p:extLst>
-  </p:cSld>
-  <p:clrMapOvr>
-    <a:masterClrMapping/>
-  </p:clrMapOvr>
+  <p:timing>
+    <p:tnLst>
+      <p:par>
+        <p:cTn id="1" dur="indefinite" restart="never" nodeType="tmRoot"/>
+      </p:par>
+    </p:tnLst>
+  </p:timing>
 </p:sld>
 </file>
 
@@ -14936,7 +15812,7 @@
           <a:p>
             <a:r>
               <a:rPr lang="ru-RU" dirty="0" smtClean="0"/>
-              <a:t>Компоненты системы</a:t>
+              <a:t>Функционал системы</a:t>
             </a:r>
             <a:endParaRPr lang="ru-RU" dirty="0"/>
           </a:p>
@@ -14957,6 +15833,132 @@
           <a:bodyPr/>
           <a:lstStyle/>
           <a:p>
+            <a:r>
+              <a:rPr lang="ru-RU" dirty="0" smtClean="0"/>
+              <a:t>Удаленное включение</a:t>
+            </a:r>
+            <a:r>
+              <a:rPr lang="en-US" dirty="0" smtClean="0"/>
+              <a:t>/</a:t>
+            </a:r>
+            <a:r>
+              <a:rPr lang="ru-RU" dirty="0" smtClean="0"/>
+              <a:t>выключение</a:t>
+            </a:r>
+          </a:p>
+          <a:p>
+            <a:r>
+              <a:rPr lang="ru-RU" dirty="0" smtClean="0"/>
+              <a:t>Регулировка яркости освещения </a:t>
+            </a:r>
+          </a:p>
+          <a:p>
+            <a:r>
+              <a:rPr lang="ru-RU" dirty="0" smtClean="0"/>
+              <a:t>Автоматическое включение/отключение </a:t>
+            </a:r>
+            <a:endParaRPr lang="ru-RU" dirty="0"/>
+          </a:p>
+        </p:txBody>
+      </p:sp>
+      <p:sp>
+        <p:nvSpPr>
+          <p:cNvPr id="4" name="Номер слайда 3"/>
+          <p:cNvSpPr>
+            <a:spLocks noGrp="1"/>
+          </p:cNvSpPr>
+          <p:nvPr>
+            <p:ph type="sldNum" sz="quarter" idx="12"/>
+          </p:nvPr>
+        </p:nvSpPr>
+        <p:spPr/>
+        <p:txBody>
+          <a:bodyPr/>
+          <a:lstStyle/>
+          <a:p>
+            <a:fld id="{8909925F-0AE6-4482-8591-DD2D52B36D50}" type="slidenum">
+              <a:rPr lang="ru-RU" smtClean="0"/>
+              <a:t>7</a:t>
+            </a:fld>
+            <a:endParaRPr lang="ru-RU"/>
+          </a:p>
+        </p:txBody>
+      </p:sp>
+    </p:spTree>
+    <p:extLst>
+      <p:ext uri="{BB962C8B-B14F-4D97-AF65-F5344CB8AC3E}">
+        <p14:creationId xmlns:p14="http://schemas.microsoft.com/office/powerpoint/2010/main" val="2029710723"/>
+      </p:ext>
+    </p:extLst>
+  </p:cSld>
+  <p:clrMapOvr>
+    <a:masterClrMapping/>
+  </p:clrMapOvr>
+  <p:timing>
+    <p:tnLst>
+      <p:par>
+        <p:cTn id="1" dur="indefinite" restart="never" nodeType="tmRoot"/>
+      </p:par>
+    </p:tnLst>
+  </p:timing>
+</p:sld>
+</file>
+
+<file path=ppt/slides/slide8.xml><?xml version="1.0" encoding="utf-8"?>
+<p:sld xmlns:a="http://schemas.openxmlformats.org/drawingml/2006/main" xmlns:r="http://schemas.openxmlformats.org/officeDocument/2006/relationships" xmlns:p="http://schemas.openxmlformats.org/presentationml/2006/main">
+  <p:cSld>
+    <p:spTree>
+      <p:nvGrpSpPr>
+        <p:cNvPr id="1" name=""/>
+        <p:cNvGrpSpPr/>
+        <p:nvPr/>
+      </p:nvGrpSpPr>
+      <p:grpSpPr>
+        <a:xfrm>
+          <a:off x="0" y="0"/>
+          <a:ext cx="0" cy="0"/>
+          <a:chOff x="0" y="0"/>
+          <a:chExt cx="0" cy="0"/>
+        </a:xfrm>
+      </p:grpSpPr>
+      <p:sp>
+        <p:nvSpPr>
+          <p:cNvPr id="2" name="Заголовок 1"/>
+          <p:cNvSpPr>
+            <a:spLocks noGrp="1"/>
+          </p:cNvSpPr>
+          <p:nvPr>
+            <p:ph type="title"/>
+          </p:nvPr>
+        </p:nvSpPr>
+        <p:spPr/>
+        <p:txBody>
+          <a:bodyPr/>
+          <a:lstStyle/>
+          <a:p>
+            <a:r>
+              <a:rPr lang="ru-RU" dirty="0" smtClean="0"/>
+              <a:t>Компоненты системы</a:t>
+            </a:r>
+            <a:endParaRPr lang="ru-RU" dirty="0"/>
+          </a:p>
+        </p:txBody>
+      </p:sp>
+      <p:sp>
+        <p:nvSpPr>
+          <p:cNvPr id="3" name="Объект 2"/>
+          <p:cNvSpPr>
+            <a:spLocks noGrp="1"/>
+          </p:cNvSpPr>
+          <p:nvPr>
+            <p:ph idx="1"/>
+          </p:nvPr>
+        </p:nvSpPr>
+        <p:spPr/>
+        <p:txBody>
+          <a:bodyPr/>
+          <a:lstStyle/>
+          <a:p>
             <a:endParaRPr lang="ru-RU" dirty="0"/>
           </a:p>
           <a:p>
@@ -14968,7 +15970,6 @@
               <a:rPr lang="en-US" dirty="0"/>
               <a:t>STM32F100 </a:t>
             </a:r>
-            <a:endParaRPr lang="en-US" dirty="0"/>
           </a:p>
           <a:p>
             <a:r>
@@ -14983,7 +15984,6 @@
               <a:rPr lang="ru-RU" dirty="0"/>
               <a:t>с фоторезистором</a:t>
             </a:r>
-            <a:endParaRPr lang="ru-RU" dirty="0"/>
           </a:p>
           <a:p>
             <a:r>
@@ -15102,6 +16102,29 @@
           </a:prstGeom>
         </p:spPr>
       </p:pic>
+      <p:sp>
+        <p:nvSpPr>
+          <p:cNvPr id="7" name="Номер слайда 6"/>
+          <p:cNvSpPr>
+            <a:spLocks noGrp="1"/>
+          </p:cNvSpPr>
+          <p:nvPr>
+            <p:ph type="sldNum" sz="quarter" idx="12"/>
+          </p:nvPr>
+        </p:nvSpPr>
+        <p:spPr/>
+        <p:txBody>
+          <a:bodyPr/>
+          <a:lstStyle/>
+          <a:p>
+            <a:fld id="{8909925F-0AE6-4482-8591-DD2D52B36D50}" type="slidenum">
+              <a:rPr lang="ru-RU" smtClean="0"/>
+              <a:t>8</a:t>
+            </a:fld>
+            <a:endParaRPr lang="ru-RU"/>
+          </a:p>
+        </p:txBody>
+      </p:sp>
     </p:spTree>
     <p:extLst>
       <p:ext uri="{BB962C8B-B14F-4D97-AF65-F5344CB8AC3E}">
@@ -15112,272 +16135,13 @@
   <p:clrMapOvr>
     <a:masterClrMapping/>
   </p:clrMapOvr>
-</p:sld>
-</file>
-
-<file path=ppt/slides/slide8.xml><?xml version="1.0" encoding="utf-8"?>
-<p:sld xmlns:a="http://schemas.openxmlformats.org/drawingml/2006/main" xmlns:r="http://schemas.openxmlformats.org/officeDocument/2006/relationships" xmlns:p="http://schemas.openxmlformats.org/presentationml/2006/main">
-  <p:cSld>
-    <p:spTree>
-      <p:nvGrpSpPr>
-        <p:cNvPr id="1" name=""/>
-        <p:cNvGrpSpPr/>
-        <p:nvPr/>
-      </p:nvGrpSpPr>
-      <p:grpSpPr>
-        <a:xfrm>
-          <a:off x="0" y="0"/>
-          <a:ext cx="0" cy="0"/>
-          <a:chOff x="0" y="0"/>
-          <a:chExt cx="0" cy="0"/>
-        </a:xfrm>
-      </p:grpSpPr>
-      <p:sp>
-        <p:nvSpPr>
-          <p:cNvPr id="2" name="Заголовок 1"/>
-          <p:cNvSpPr>
-            <a:spLocks noGrp="1"/>
-          </p:cNvSpPr>
-          <p:nvPr>
-            <p:ph type="title"/>
-          </p:nvPr>
-        </p:nvSpPr>
-        <p:spPr/>
-        <p:txBody>
-          <a:bodyPr/>
-          <a:lstStyle/>
-          <a:p>
-            <a:r>
-              <a:rPr lang="en-US" dirty="0" smtClean="0"/>
-              <a:t>STM32F100. </a:t>
-            </a:r>
-            <a:r>
-              <a:rPr lang="ru-RU" dirty="0" smtClean="0"/>
-              <a:t>Основные параметры</a:t>
-            </a:r>
-            <a:endParaRPr lang="ru-RU" dirty="0"/>
-          </a:p>
-        </p:txBody>
-      </p:sp>
-      <p:sp>
-        <p:nvSpPr>
-          <p:cNvPr id="3" name="Объект 2"/>
-          <p:cNvSpPr>
-            <a:spLocks noGrp="1"/>
-          </p:cNvSpPr>
-          <p:nvPr>
-            <p:ph idx="1"/>
-          </p:nvPr>
-        </p:nvSpPr>
-        <p:spPr>
-          <a:xfrm>
-            <a:off x="1154954" y="2603500"/>
-            <a:ext cx="8825659" cy="3998468"/>
-          </a:xfrm>
-        </p:spPr>
-        <p:txBody>
-          <a:bodyPr>
-            <a:normAutofit fontScale="25000" lnSpcReduction="20000"/>
-          </a:bodyPr>
-          <a:lstStyle/>
-          <a:p>
-            <a:endParaRPr lang="ru-RU" dirty="0"/>
-          </a:p>
-          <a:p>
-            <a:r>
-              <a:rPr lang="ru-RU" sz="6400" dirty="0"/>
-              <a:t>Максимальная тактовая частота 24 МГц (30 DMIPS) </a:t>
-            </a:r>
-          </a:p>
-          <a:p>
-            <a:r>
-              <a:rPr lang="ru-RU" sz="6400" dirty="0" smtClean="0"/>
-              <a:t>Умножение </a:t>
-            </a:r>
-            <a:r>
-              <a:rPr lang="ru-RU" sz="6400" dirty="0"/>
-              <a:t>и деление за 1 такт </a:t>
-            </a:r>
-          </a:p>
-          <a:p>
-            <a:r>
-              <a:rPr lang="ru-RU" sz="6400" dirty="0" smtClean="0"/>
-              <a:t>Напряжения </a:t>
-            </a:r>
-            <a:r>
-              <a:rPr lang="ru-RU" sz="6400" dirty="0"/>
-              <a:t>питания 2.0 – 3.6 В </a:t>
-            </a:r>
-          </a:p>
-          <a:p>
-            <a:r>
-              <a:rPr lang="ru-RU" sz="6400" dirty="0" smtClean="0"/>
-              <a:t>От </a:t>
-            </a:r>
-            <a:r>
-              <a:rPr lang="ru-RU" sz="6400" dirty="0"/>
-              <a:t>16 до 128 Кб флэш-памяти </a:t>
-            </a:r>
-            <a:endParaRPr lang="ru-RU" sz="6400" dirty="0" smtClean="0"/>
-          </a:p>
-          <a:p>
-            <a:r>
-              <a:rPr lang="ru-RU" sz="6400" dirty="0"/>
-              <a:t>16-канальный 12-битный АЦП (1.2 </a:t>
-            </a:r>
-            <a:r>
-              <a:rPr lang="ru-RU" sz="6400" dirty="0" err="1"/>
-              <a:t>мкс</a:t>
-            </a:r>
-            <a:r>
-              <a:rPr lang="ru-RU" sz="6400" dirty="0"/>
-              <a:t>) с датчиком температуры </a:t>
-            </a:r>
-          </a:p>
-          <a:p>
-            <a:r>
-              <a:rPr lang="ru-RU" sz="6400" dirty="0"/>
-              <a:t>Два 12–битных ЦАП </a:t>
-            </a:r>
-            <a:endParaRPr lang="ru-RU" sz="6400" dirty="0" smtClean="0"/>
-          </a:p>
-          <a:p>
-            <a:r>
-              <a:rPr lang="ru-RU" sz="6400" dirty="0" smtClean="0"/>
-              <a:t>До </a:t>
-            </a:r>
-            <a:r>
-              <a:rPr lang="ru-RU" sz="6400" dirty="0"/>
-              <a:t>80 быстрых портов ввода – вывода (есть совместимость с 5 В) </a:t>
-            </a:r>
-          </a:p>
-          <a:p>
-            <a:r>
-              <a:rPr lang="ru-RU" sz="6400" dirty="0" smtClean="0"/>
-              <a:t>Два </a:t>
-            </a:r>
-            <a:r>
-              <a:rPr lang="ru-RU" sz="6400" dirty="0"/>
-              <a:t>сторожевых таймера (IWDG и WWDG) </a:t>
-            </a:r>
-          </a:p>
-          <a:p>
-            <a:r>
-              <a:rPr lang="ru-RU" sz="6400" dirty="0" smtClean="0"/>
-              <a:t>До </a:t>
-            </a:r>
-            <a:r>
-              <a:rPr lang="ru-RU" sz="6400" dirty="0"/>
-              <a:t>10 таймеров общего и расширенного назначений </a:t>
-            </a:r>
-          </a:p>
-          <a:p>
-            <a:r>
-              <a:rPr lang="ru-RU" sz="6400" dirty="0" smtClean="0"/>
-              <a:t>До </a:t>
-            </a:r>
-            <a:r>
-              <a:rPr lang="ru-RU" sz="6400" dirty="0"/>
-              <a:t>2х </a:t>
-            </a:r>
-            <a:r>
-              <a:rPr lang="en-US" sz="6400" dirty="0"/>
-              <a:t>I2C(</a:t>
-            </a:r>
-            <a:r>
-              <a:rPr lang="en-US" sz="6400" dirty="0" err="1"/>
-              <a:t>SMBus</a:t>
-            </a:r>
-            <a:r>
-              <a:rPr lang="en-US" sz="6400" dirty="0"/>
-              <a:t>/</a:t>
-            </a:r>
-            <a:r>
-              <a:rPr lang="en-US" sz="6400" dirty="0" err="1"/>
-              <a:t>PMBus</a:t>
-            </a:r>
-            <a:r>
-              <a:rPr lang="en-US" sz="6400" dirty="0"/>
-              <a:t>), </a:t>
-            </a:r>
-            <a:r>
-              <a:rPr lang="ru-RU" sz="6400" dirty="0"/>
-              <a:t>до 3х </a:t>
-            </a:r>
-            <a:r>
-              <a:rPr lang="en-US" sz="6400" dirty="0"/>
-              <a:t>USART (Lin, </a:t>
-            </a:r>
-            <a:r>
-              <a:rPr lang="en-US" sz="6400" dirty="0" err="1"/>
-              <a:t>IrDa</a:t>
-            </a:r>
-            <a:r>
-              <a:rPr lang="en-US" sz="6400" dirty="0"/>
-              <a:t>, modem control), </a:t>
-            </a:r>
-            <a:r>
-              <a:rPr lang="ru-RU" sz="6400" dirty="0"/>
-              <a:t>до 2 </a:t>
-            </a:r>
-            <a:r>
-              <a:rPr lang="en-US" sz="6400" dirty="0"/>
-              <a:t>SPI(2 </a:t>
-            </a:r>
-            <a:r>
-              <a:rPr lang="ru-RU" sz="6400" dirty="0"/>
-              <a:t>Мбит/с), </a:t>
-            </a:r>
-            <a:r>
-              <a:rPr lang="en-US" sz="6400" dirty="0"/>
-              <a:t>HDMI (CEC), RTC </a:t>
-            </a:r>
-          </a:p>
-          <a:p>
-            <a:endParaRPr lang="ru-RU" dirty="0"/>
-          </a:p>
-        </p:txBody>
-      </p:sp>
-      <p:pic>
-        <p:nvPicPr>
-          <p:cNvPr id="4" name="Рисунок 3"/>
-          <p:cNvPicPr>
-            <a:picLocks noChangeAspect="1"/>
-          </p:cNvPicPr>
-          <p:nvPr/>
-        </p:nvPicPr>
-        <p:blipFill>
-          <a:blip r:embed="rId2">
-            <a:extLst>
-              <a:ext uri="{28A0092B-C50C-407E-A947-70E740481C1C}">
-                <a14:useLocalDpi xmlns:a14="http://schemas.microsoft.com/office/drawing/2010/main" val="0"/>
-              </a:ext>
-            </a:extLst>
-          </a:blip>
-          <a:stretch>
-            <a:fillRect/>
-          </a:stretch>
-        </p:blipFill>
-        <p:spPr>
-          <a:xfrm>
-            <a:off x="8360911" y="2523744"/>
-            <a:ext cx="3770275" cy="3182112"/>
-          </a:xfrm>
-          <a:prstGeom prst="rect">
-            <a:avLst/>
-          </a:prstGeom>
-        </p:spPr>
-      </p:pic>
-    </p:spTree>
-    <p:extLst>
-      <p:ext uri="{BB962C8B-B14F-4D97-AF65-F5344CB8AC3E}">
-        <p14:creationId xmlns:p14="http://schemas.microsoft.com/office/powerpoint/2010/main" val="2154210626"/>
-      </p:ext>
-    </p:extLst>
-  </p:cSld>
-  <p:clrMapOvr>
-    <a:masterClrMapping/>
-  </p:clrMapOvr>
+  <p:timing>
+    <p:tnLst>
+      <p:par>
+        <p:cTn id="1" dur="indefinite" restart="never" nodeType="tmRoot"/>
+      </p:par>
+    </p:tnLst>
+  </p:timing>
 </p:sld>
 </file>
 
@@ -15408,86 +16172,94 @@
             <p:ph type="title"/>
           </p:nvPr>
         </p:nvSpPr>
+        <p:spPr>
+          <a:xfrm>
+            <a:off x="1154954" y="973668"/>
+            <a:ext cx="8761413" cy="1083732"/>
+          </a:xfrm>
+        </p:spPr>
+        <p:txBody>
+          <a:bodyPr/>
+          <a:lstStyle/>
+          <a:p>
+            <a:pPr algn="ctr"/>
+            <a:r>
+              <a:rPr lang="ru-RU" dirty="0" smtClean="0"/>
+              <a:t>Управление яркостью при помощи ШИМ</a:t>
+            </a:r>
+            <a:endParaRPr lang="ru-RU" dirty="0"/>
+          </a:p>
+        </p:txBody>
+      </p:sp>
+      <p:pic>
+        <p:nvPicPr>
+          <p:cNvPr id="6" name="Объект 5"/>
+          <p:cNvPicPr>
+            <a:picLocks noGrp="1" noChangeAspect="1"/>
+          </p:cNvPicPr>
+          <p:nvPr>
+            <p:ph idx="1"/>
+          </p:nvPr>
+        </p:nvPicPr>
+        <p:blipFill>
+          <a:blip r:embed="rId2" cstate="print">
+            <a:extLst>
+              <a:ext uri="{28A0092B-C50C-407E-A947-70E740481C1C}">
+                <a14:useLocalDpi xmlns:a14="http://schemas.microsoft.com/office/drawing/2010/main" val="0"/>
+              </a:ext>
+            </a:extLst>
+          </a:blip>
+          <a:stretch>
+            <a:fillRect/>
+          </a:stretch>
+        </p:blipFill>
+        <p:spPr>
+          <a:xfrm>
+            <a:off x="3145536" y="2188234"/>
+            <a:ext cx="5788152" cy="4669766"/>
+          </a:xfrm>
+        </p:spPr>
+      </p:pic>
+      <p:sp>
+        <p:nvSpPr>
+          <p:cNvPr id="3" name="Номер слайда 2"/>
+          <p:cNvSpPr>
+            <a:spLocks noGrp="1"/>
+          </p:cNvSpPr>
+          <p:nvPr>
+            <p:ph type="sldNum" sz="quarter" idx="12"/>
+          </p:nvPr>
+        </p:nvSpPr>
         <p:spPr/>
         <p:txBody>
           <a:bodyPr/>
           <a:lstStyle/>
           <a:p>
-            <a:r>
-              <a:rPr lang="en-US" dirty="0" smtClean="0"/>
-              <a:t>ESP8266-01. </a:t>
-            </a:r>
-            <a:r>
-              <a:rPr lang="ru-RU" dirty="0" smtClean="0"/>
-              <a:t>Шаги по настройке</a:t>
-            </a:r>
-            <a:endParaRPr lang="ru-RU" dirty="0"/>
-          </a:p>
-        </p:txBody>
-      </p:sp>
-      <p:sp>
-        <p:nvSpPr>
-          <p:cNvPr id="3" name="Объект 2"/>
-          <p:cNvSpPr>
-            <a:spLocks noGrp="1"/>
-          </p:cNvSpPr>
-          <p:nvPr>
-            <p:ph idx="1"/>
-          </p:nvPr>
-        </p:nvSpPr>
-        <p:spPr/>
-        <p:txBody>
-          <a:bodyPr/>
-          <a:lstStyle/>
-          <a:p>
-            <a:pPr>
-              <a:buFont typeface="+mj-lt"/>
-              <a:buAutoNum type="arabicPeriod"/>
-            </a:pPr>
-            <a:r>
-              <a:rPr lang="ru-RU" dirty="0" smtClean="0"/>
-              <a:t>При помощи АТ-команд конфигурирует в режим </a:t>
-            </a:r>
-            <a:r>
-              <a:rPr lang="en-US" dirty="0" smtClean="0"/>
-              <a:t>TCP </a:t>
-            </a:r>
-            <a:r>
-              <a:rPr lang="ru-RU" dirty="0" smtClean="0"/>
-              <a:t>сервера и подключаем к существующей сети</a:t>
-            </a:r>
-          </a:p>
-          <a:p>
-            <a:pPr>
-              <a:buFont typeface="+mj-lt"/>
-              <a:buAutoNum type="arabicPeriod"/>
-            </a:pPr>
-            <a:r>
-              <a:rPr lang="ru-RU" dirty="0" smtClean="0"/>
-              <a:t>Подключаем через </a:t>
-            </a:r>
-            <a:r>
-              <a:rPr lang="en-US" dirty="0" smtClean="0"/>
-              <a:t>UART </a:t>
-            </a:r>
-            <a:r>
-              <a:rPr lang="ru-RU" dirty="0" smtClean="0"/>
-              <a:t>к микроконтроллеру</a:t>
-            </a:r>
-            <a:endParaRPr lang="ru-RU" dirty="0"/>
+            <a:fld id="{8909925F-0AE6-4482-8591-DD2D52B36D50}" type="slidenum">
+              <a:rPr lang="ru-RU" smtClean="0"/>
+              <a:t>9</a:t>
+            </a:fld>
+            <a:endParaRPr lang="ru-RU"/>
           </a:p>
         </p:txBody>
       </p:sp>
     </p:spTree>
     <p:extLst>
       <p:ext uri="{BB962C8B-B14F-4D97-AF65-F5344CB8AC3E}">
-        <p14:creationId xmlns:p14="http://schemas.microsoft.com/office/powerpoint/2010/main" val="3816176970"/>
+        <p14:creationId xmlns:p14="http://schemas.microsoft.com/office/powerpoint/2010/main" val="4273982296"/>
       </p:ext>
     </p:extLst>
   </p:cSld>
   <p:clrMapOvr>
     <a:masterClrMapping/>
   </p:clrMapOvr>
+  <p:timing>
+    <p:tnLst>
+      <p:par>
+        <p:cTn id="1" dur="indefinite" restart="never" nodeType="tmRoot"/>
+      </p:par>
+    </p:tnLst>
+  </p:timing>
 </p:sld>
 </file>
 
@@ -15753,4 +16525,265 @@
     </a:ext>
   </a:extLst>
 </a:theme>
+</file>
+
+<file path=ppt/theme/theme2.xml><?xml version="1.0" encoding="utf-8"?>
+<a:theme xmlns:a="http://schemas.openxmlformats.org/drawingml/2006/main" name="Тема Office">
+  <a:themeElements>
+    <a:clrScheme name="Стандартная">
+      <a:dk1>
+        <a:sysClr val="windowText" lastClr="000000"/>
+      </a:dk1>
+      <a:lt1>
+        <a:sysClr val="window" lastClr="FFFFFF"/>
+      </a:lt1>
+      <a:dk2>
+        <a:srgbClr val="44546A"/>
+      </a:dk2>
+      <a:lt2>
+        <a:srgbClr val="E7E6E6"/>
+      </a:lt2>
+      <a:accent1>
+        <a:srgbClr val="5B9BD5"/>
+      </a:accent1>
+      <a:accent2>
+        <a:srgbClr val="ED7D31"/>
+      </a:accent2>
+      <a:accent3>
+        <a:srgbClr val="A5A5A5"/>
+      </a:accent3>
+      <a:accent4>
+        <a:srgbClr val="FFC000"/>
+      </a:accent4>
+      <a:accent5>
+        <a:srgbClr val="4472C4"/>
+      </a:accent5>
+      <a:accent6>
+        <a:srgbClr val="70AD47"/>
+      </a:accent6>
+      <a:hlink>
+        <a:srgbClr val="0563C1"/>
+      </a:hlink>
+      <a:folHlink>
+        <a:srgbClr val="954F72"/>
+      </a:folHlink>
+    </a:clrScheme>
+    <a:fontScheme name="Стандартная">
+      <a:majorFont>
+        <a:latin typeface="Calibri Light" panose="020F0302020204030204"/>
+        <a:ea typeface=""/>
+        <a:cs typeface=""/>
+        <a:font script="Jpan" typeface="游ゴシック Light"/>
+        <a:font script="Hang" typeface="맑은 고딕"/>
+        <a:font script="Hans" typeface="等线 Light"/>
+        <a:font script="Hant" typeface="新細明體"/>
+        <a:font script="Arab" typeface="Times New Roman"/>
+        <a:font script="Hebr" typeface="Times New Roman"/>
+        <a:font script="Thai" typeface="Angsana New"/>
+        <a:font script="Ethi" typeface="Nyala"/>
+        <a:font script="Beng" typeface="Vrinda"/>
+        <a:font script="Gujr" typeface="Shruti"/>
+        <a:font script="Khmr" typeface="MoolBoran"/>
+        <a:font script="Knda" typeface="Tunga"/>
+        <a:font script="Guru" typeface="Raavi"/>
+        <a:font script="Cans" typeface="Euphemia"/>
+        <a:font script="Cher" typeface="Plantagenet Cherokee"/>
+        <a:font script="Yiii" typeface="Microsoft Yi Baiti"/>
+        <a:font script="Tibt" typeface="Microsoft Himalaya"/>
+        <a:font script="Thaa" typeface="MV Boli"/>
+        <a:font script="Deva" typeface="Mangal"/>
+        <a:font script="Telu" typeface="Gautami"/>
+        <a:font script="Taml" typeface="Latha"/>
+        <a:font script="Syrc" typeface="Estrangelo Edessa"/>
+        <a:font script="Orya" typeface="Kalinga"/>
+        <a:font script="Mlym" typeface="Kartika"/>
+        <a:font script="Laoo" typeface="DokChampa"/>
+        <a:font script="Sinh" typeface="Iskoola Pota"/>
+        <a:font script="Mong" typeface="Mongolian Baiti"/>
+        <a:font script="Viet" typeface="Times New Roman"/>
+        <a:font script="Uigh" typeface="Microsoft Uighur"/>
+        <a:font script="Geor" typeface="Sylfaen"/>
+      </a:majorFont>
+      <a:minorFont>
+        <a:latin typeface="Calibri" panose="020F0502020204030204"/>
+        <a:ea typeface=""/>
+        <a:cs typeface=""/>
+        <a:font script="Jpan" typeface="游ゴシック"/>
+        <a:font script="Hang" typeface="맑은 고딕"/>
+        <a:font script="Hans" typeface="等线"/>
+        <a:font script="Hant" typeface="新細明體"/>
+        <a:font script="Arab" typeface="Arial"/>
+        <a:font script="Hebr" typeface="Arial"/>
+        <a:font script="Thai" typeface="Cordia New"/>
+        <a:font script="Ethi" typeface="Nyala"/>
+        <a:font script="Beng" typeface="Vrinda"/>
+        <a:font script="Gujr" typeface="Shruti"/>
+        <a:font script="Khmr" typeface="DaunPenh"/>
+        <a:font script="Knda" typeface="Tunga"/>
+        <a:font script="Guru" typeface="Raavi"/>
+        <a:font script="Cans" typeface="Euphemia"/>
+        <a:font script="Cher" typeface="Plantagenet Cherokee"/>
+        <a:font script="Yiii" typeface="Microsoft Yi Baiti"/>
+        <a:font script="Tibt" typeface="Microsoft Himalaya"/>
+        <a:font script="Thaa" typeface="MV Boli"/>
+        <a:font script="Deva" typeface="Mangal"/>
+        <a:font script="Telu" typeface="Gautami"/>
+        <a:font script="Taml" typeface="Latha"/>
+        <a:font script="Syrc" typeface="Estrangelo Edessa"/>
+        <a:font script="Orya" typeface="Kalinga"/>
+        <a:font script="Mlym" typeface="Kartika"/>
+        <a:font script="Laoo" typeface="DokChampa"/>
+        <a:font script="Sinh" typeface="Iskoola Pota"/>
+        <a:font script="Mong" typeface="Mongolian Baiti"/>
+        <a:font script="Viet" typeface="Arial"/>
+        <a:font script="Uigh" typeface="Microsoft Uighur"/>
+        <a:font script="Geor" typeface="Sylfaen"/>
+      </a:minorFont>
+    </a:fontScheme>
+    <a:fmtScheme name="Стандартная">
+      <a:fillStyleLst>
+        <a:solidFill>
+          <a:schemeClr val="phClr"/>
+        </a:solidFill>
+        <a:gradFill rotWithShape="1">
+          <a:gsLst>
+            <a:gs pos="0">
+              <a:schemeClr val="phClr">
+                <a:lumMod val="110000"/>
+                <a:satMod val="105000"/>
+                <a:tint val="67000"/>
+              </a:schemeClr>
+            </a:gs>
+            <a:gs pos="50000">
+              <a:schemeClr val="phClr">
+                <a:lumMod val="105000"/>
+                <a:satMod val="103000"/>
+                <a:tint val="73000"/>
+              </a:schemeClr>
+            </a:gs>
+            <a:gs pos="100000">
+              <a:schemeClr val="phClr">
+                <a:lumMod val="105000"/>
+                <a:satMod val="109000"/>
+                <a:tint val="81000"/>
+              </a:schemeClr>
+            </a:gs>
+          </a:gsLst>
+          <a:lin ang="5400000" scaled="0"/>
+        </a:gradFill>
+        <a:gradFill rotWithShape="1">
+          <a:gsLst>
+            <a:gs pos="0">
+              <a:schemeClr val="phClr">
+                <a:satMod val="103000"/>
+                <a:lumMod val="102000"/>
+                <a:tint val="94000"/>
+              </a:schemeClr>
+            </a:gs>
+            <a:gs pos="50000">
+              <a:schemeClr val="phClr">
+                <a:satMod val="110000"/>
+                <a:lumMod val="100000"/>
+                <a:shade val="100000"/>
+              </a:schemeClr>
+            </a:gs>
+            <a:gs pos="100000">
+              <a:schemeClr val="phClr">
+                <a:lumMod val="99000"/>
+                <a:satMod val="120000"/>
+                <a:shade val="78000"/>
+              </a:schemeClr>
+            </a:gs>
+          </a:gsLst>
+          <a:lin ang="5400000" scaled="0"/>
+        </a:gradFill>
+      </a:fillStyleLst>
+      <a:lnStyleLst>
+        <a:ln w="6350" cap="flat" cmpd="sng" algn="ctr">
+          <a:solidFill>
+            <a:schemeClr val="phClr"/>
+          </a:solidFill>
+          <a:prstDash val="solid"/>
+          <a:miter lim="800000"/>
+        </a:ln>
+        <a:ln w="12700" cap="flat" cmpd="sng" algn="ctr">
+          <a:solidFill>
+            <a:schemeClr val="phClr"/>
+          </a:solidFill>
+          <a:prstDash val="solid"/>
+          <a:miter lim="800000"/>
+        </a:ln>
+        <a:ln w="19050" cap="flat" cmpd="sng" algn="ctr">
+          <a:solidFill>
+            <a:schemeClr val="phClr"/>
+          </a:solidFill>
+          <a:prstDash val="solid"/>
+          <a:miter lim="800000"/>
+        </a:ln>
+      </a:lnStyleLst>
+      <a:effectStyleLst>
+        <a:effectStyle>
+          <a:effectLst/>
+        </a:effectStyle>
+        <a:effectStyle>
+          <a:effectLst/>
+        </a:effectStyle>
+        <a:effectStyle>
+          <a:effectLst>
+            <a:outerShdw blurRad="57150" dist="19050" dir="5400000" algn="ctr" rotWithShape="0">
+              <a:srgbClr val="000000">
+                <a:alpha val="63000"/>
+              </a:srgbClr>
+            </a:outerShdw>
+          </a:effectLst>
+        </a:effectStyle>
+      </a:effectStyleLst>
+      <a:bgFillStyleLst>
+        <a:solidFill>
+          <a:schemeClr val="phClr"/>
+        </a:solidFill>
+        <a:solidFill>
+          <a:schemeClr val="phClr">
+            <a:tint val="95000"/>
+            <a:satMod val="170000"/>
+          </a:schemeClr>
+        </a:solidFill>
+        <a:gradFill rotWithShape="1">
+          <a:gsLst>
+            <a:gs pos="0">
+              <a:schemeClr val="phClr">
+                <a:tint val="93000"/>
+                <a:satMod val="150000"/>
+                <a:shade val="98000"/>
+                <a:lumMod val="102000"/>
+              </a:schemeClr>
+            </a:gs>
+            <a:gs pos="50000">
+              <a:schemeClr val="phClr">
+                <a:tint val="98000"/>
+                <a:satMod val="130000"/>
+                <a:shade val="90000"/>
+                <a:lumMod val="103000"/>
+              </a:schemeClr>
+            </a:gs>
+            <a:gs pos="100000">
+              <a:schemeClr val="phClr">
+                <a:shade val="63000"/>
+                <a:satMod val="120000"/>
+              </a:schemeClr>
+            </a:gs>
+          </a:gsLst>
+          <a:lin ang="5400000" scaled="0"/>
+        </a:gradFill>
+      </a:bgFillStyleLst>
+    </a:fmtScheme>
+  </a:themeElements>
+  <a:objectDefaults/>
+  <a:extraClrSchemeLst/>
+  <a:extLst>
+    <a:ext uri="{05A4C25C-085E-4340-85A3-A5531E510DB2}">
+      <thm15:themeFamily xmlns:thm15="http://schemas.microsoft.com/office/thememl/2012/main" name="Office Theme" id="{62F939B6-93AF-4DB8-9C6B-D6C7DFDC589F}" vid="{4A3C46E8-61CC-4603-A589-7422A47A8E4A}"/>
+    </a:ext>
+  </a:extLst>
+</a:theme>
 </file>
</xml_diff>

<commit_message>
one more last fix
</commit_message>
<xml_diff>
--- a/диплом.pptx
+++ b/диплом.pptx
@@ -243,7 +243,7 @@
           <a:p>
             <a:fld id="{98164DDF-B1A3-4EC3-9CF7-DB5DC2156E89}" type="datetimeFigureOut">
               <a:rPr lang="ru-RU" smtClean="0"/>
-              <a:t>23.06.2018</a:t>
+              <a:t>24.06.2018</a:t>
             </a:fld>
             <a:endParaRPr lang="ru-RU"/>
           </a:p>
@@ -846,7 +846,7 @@
           <a:p>
             <a:fld id="{1F3BFE95-40AA-40EE-A178-43B122002C07}" type="datetime1">
               <a:rPr lang="ru-RU" smtClean="0"/>
-              <a:t>23.06.2018</a:t>
+              <a:t>24.06.2018</a:t>
             </a:fld>
             <a:endParaRPr lang="ru-RU"/>
           </a:p>
@@ -1934,7 +1934,7 @@
           <a:p>
             <a:fld id="{1C9523FB-BC31-4CA2-B847-C19A42F37CBA}" type="datetime1">
               <a:rPr lang="ru-RU" smtClean="0"/>
-              <a:t>23.06.2018</a:t>
+              <a:t>24.06.2018</a:t>
             </a:fld>
             <a:endParaRPr lang="ru-RU"/>
           </a:p>
@@ -2914,7 +2914,7 @@
           <a:p>
             <a:fld id="{F03BA7CE-1C1C-46F2-8400-EC3E13FE4227}" type="datetime1">
               <a:rPr lang="ru-RU" smtClean="0"/>
-              <a:t>23.06.2018</a:t>
+              <a:t>24.06.2018</a:t>
             </a:fld>
             <a:endParaRPr lang="ru-RU"/>
           </a:p>
@@ -4048,7 +4048,7 @@
           <a:p>
             <a:fld id="{CE67C553-85A3-44D1-B05D-0EC76C5DFA7C}" type="datetime1">
               <a:rPr lang="ru-RU" smtClean="0"/>
-              <a:t>23.06.2018</a:t>
+              <a:t>24.06.2018</a:t>
             </a:fld>
             <a:endParaRPr lang="ru-RU"/>
           </a:p>
@@ -5081,7 +5081,7 @@
           <a:p>
             <a:fld id="{BCA60730-C8CA-4BAD-BCA3-B55A11F4E67A}" type="datetime1">
               <a:rPr lang="ru-RU" smtClean="0"/>
-              <a:t>23.06.2018</a:t>
+              <a:t>24.06.2018</a:t>
             </a:fld>
             <a:endParaRPr lang="ru-RU"/>
           </a:p>
@@ -5741,7 +5741,7 @@
           <a:p>
             <a:fld id="{3725E77C-B66C-4C1C-9067-B11B0E207348}" type="datetime1">
               <a:rPr lang="ru-RU" smtClean="0"/>
-              <a:t>23.06.2018</a:t>
+              <a:t>24.06.2018</a:t>
             </a:fld>
             <a:endParaRPr lang="ru-RU"/>
           </a:p>
@@ -6602,7 +6602,7 @@
           <a:p>
             <a:fld id="{B162EBE7-D446-4878-A8FC-41F28120AA00}" type="datetime1">
               <a:rPr lang="ru-RU" smtClean="0"/>
-              <a:t>23.06.2018</a:t>
+              <a:t>24.06.2018</a:t>
             </a:fld>
             <a:endParaRPr lang="ru-RU"/>
           </a:p>
@@ -6792,7 +6792,7 @@
           <a:p>
             <a:fld id="{EC25E487-2934-4D3D-BE4B-719AC8863156}" type="datetime1">
               <a:rPr lang="ru-RU" smtClean="0"/>
-              <a:t>23.06.2018</a:t>
+              <a:t>24.06.2018</a:t>
             </a:fld>
             <a:endParaRPr lang="ru-RU"/>
           </a:p>
@@ -7764,7 +7764,7 @@
           <a:p>
             <a:fld id="{65C8B421-570E-42F0-930C-0C8BA55466F9}" type="datetime1">
               <a:rPr lang="ru-RU" smtClean="0"/>
-              <a:t>23.06.2018</a:t>
+              <a:t>24.06.2018</a:t>
             </a:fld>
             <a:endParaRPr lang="ru-RU"/>
           </a:p>
@@ -7975,7 +7975,7 @@
           <a:p>
             <a:fld id="{2C039C95-375E-416C-B19B-807F26F998D3}" type="datetime1">
               <a:rPr lang="ru-RU" smtClean="0"/>
-              <a:t>23.06.2018</a:t>
+              <a:t>24.06.2018</a:t>
             </a:fld>
             <a:endParaRPr lang="ru-RU"/>
           </a:p>
@@ -9009,7 +9009,7 @@
           <a:p>
             <a:fld id="{D3CA89CD-22F8-44D9-8C2A-8A4EC8585FF1}" type="datetime1">
               <a:rPr lang="ru-RU" smtClean="0"/>
-              <a:t>23.06.2018</a:t>
+              <a:t>24.06.2018</a:t>
             </a:fld>
             <a:endParaRPr lang="ru-RU"/>
           </a:p>
@@ -9281,7 +9281,7 @@
           <a:p>
             <a:fld id="{70DDAB75-6A6C-4724-BDE6-4501BB847D49}" type="datetime1">
               <a:rPr lang="ru-RU" smtClean="0"/>
-              <a:t>23.06.2018</a:t>
+              <a:t>24.06.2018</a:t>
             </a:fld>
             <a:endParaRPr lang="ru-RU"/>
           </a:p>
@@ -9691,7 +9691,7 @@
           <a:p>
             <a:fld id="{2CFB671A-85DA-4AAB-ADC1-222A552E5400}" type="datetime1">
               <a:rPr lang="ru-RU" smtClean="0"/>
-              <a:t>23.06.2018</a:t>
+              <a:t>24.06.2018</a:t>
             </a:fld>
             <a:endParaRPr lang="ru-RU"/>
           </a:p>
@@ -9818,7 +9818,7 @@
           <a:p>
             <a:fld id="{3195341F-3C93-4486-B7E5-92ADAFDC931C}" type="datetime1">
               <a:rPr lang="ru-RU" smtClean="0"/>
-              <a:t>23.06.2018</a:t>
+              <a:t>24.06.2018</a:t>
             </a:fld>
             <a:endParaRPr lang="ru-RU"/>
           </a:p>
@@ -9913,7 +9913,7 @@
           <a:p>
             <a:fld id="{B730EDCF-418D-4321-B069-D15ECE112F14}" type="datetime1">
               <a:rPr lang="ru-RU" smtClean="0"/>
-              <a:t>23.06.2018</a:t>
+              <a:t>24.06.2018</a:t>
             </a:fld>
             <a:endParaRPr lang="ru-RU"/>
           </a:p>
@@ -10994,7 +10994,7 @@
           <a:p>
             <a:fld id="{30CC2BA9-7D3B-4B27-B338-E418E1F0E626}" type="datetime1">
               <a:rPr lang="ru-RU" smtClean="0"/>
-              <a:t>23.06.2018</a:t>
+              <a:t>24.06.2018</a:t>
             </a:fld>
             <a:endParaRPr lang="ru-RU"/>
           </a:p>
@@ -12102,7 +12102,7 @@
           <a:p>
             <a:fld id="{70F4A56B-4F57-472F-B3AE-11DEE44570B9}" type="datetime1">
               <a:rPr lang="ru-RU" smtClean="0"/>
-              <a:t>23.06.2018</a:t>
+              <a:t>24.06.2018</a:t>
             </a:fld>
             <a:endParaRPr lang="ru-RU"/>
           </a:p>
@@ -13099,7 +13099,7 @@
           <a:p>
             <a:fld id="{0BA50A6D-B2AD-4126-B2A7-833128D59F13}" type="datetime1">
               <a:rPr lang="ru-RU" smtClean="0"/>
-              <a:t>23.06.2018</a:t>
+              <a:t>24.06.2018</a:t>
             </a:fld>
             <a:endParaRPr lang="ru-RU"/>
           </a:p>
@@ -13740,7 +13740,15 @@
             </a:r>
             <a:r>
               <a:rPr lang="ru-RU" sz="2100" dirty="0"/>
-              <a:t>. геогр. н., доц. 	</a:t>
+              <a:t>. геогр. н., </a:t>
+            </a:r>
+            <a:r>
+              <a:rPr lang="ru-RU" sz="2100" dirty="0" smtClean="0"/>
+              <a:t>доцент</a:t>
+            </a:r>
+            <a:r>
+              <a:rPr lang="ru-RU" sz="2100" dirty="0"/>
+              <a:t> </a:t>
             </a:r>
             <a:r>
               <a:rPr lang="ru-RU" sz="2100" dirty="0" smtClean="0"/>

</xml_diff>